<commit_message>
4 Spanish Lessons Added
</commit_message>
<xml_diff>
--- a/translations/es/beginner/Loops.pptx
+++ b/translations/es/beginner/Loops.pptx
@@ -18,7 +18,7 @@
     <p:sldId id="306" r:id="rId6"/>
     <p:sldId id="405" r:id="rId7"/>
     <p:sldId id="406" r:id="rId8"/>
-    <p:sldId id="404" r:id="rId9"/>
+    <p:sldId id="409" r:id="rId9"/>
   </p:sldIdLst>
   <p:sldSz cx="9144000" cy="6858000" type="screen4x3"/>
   <p:notesSz cx="6858000" cy="9144000"/>
@@ -136,6 +136,10 @@
 </p:presentation>
 </file>
 
+<file path=ppt/revisionInfo.xml><?xml version="1.0" encoding="utf-8"?>
+<p1510:revInfo xmlns:a="http://schemas.openxmlformats.org/drawingml/2006/main" xmlns:r="http://schemas.openxmlformats.org/officeDocument/2006/relationships" xmlns:p1510="http://schemas.microsoft.com/office/powerpoint/2015/10/main"/>
+</file>
+
 <file path=ppt/handoutMasters/handoutMaster1.xml><?xml version="1.0" encoding="utf-8"?>
 <p:handoutMaster xmlns:a="http://schemas.openxmlformats.org/drawingml/2006/main" xmlns:r="http://schemas.openxmlformats.org/officeDocument/2006/relationships" xmlns:p="http://schemas.openxmlformats.org/presentationml/2006/main">
   <p:cSld>
@@ -185,7 +189,7 @@
             </a:lvl1pPr>
           </a:lstStyle>
           <a:p>
-            <a:endParaRPr lang="en-US"/>
+            <a:endParaRPr lang="en-US" dirty="0"/>
           </a:p>
         </p:txBody>
       </p:sp>
@@ -218,9 +222,9 @@
           <a:p>
             <a:fld id="{F8D9B3D7-15CB-9343-AA49-EFB5A8F33F18}" type="datetimeFigureOut">
               <a:rPr lang="en-US" smtClean="0"/>
-              <a:t>7/26/16</a:t>
+              <a:t>9/5/2017</a:t>
             </a:fld>
-            <a:endParaRPr lang="en-US"/>
+            <a:endParaRPr lang="en-US" dirty="0"/>
           </a:p>
         </p:txBody>
       </p:sp>
@@ -251,7 +255,7 @@
             </a:lvl1pPr>
           </a:lstStyle>
           <a:p>
-            <a:endParaRPr lang="en-US"/>
+            <a:endParaRPr lang="en-US" dirty="0"/>
           </a:p>
         </p:txBody>
       </p:sp>
@@ -286,7 +290,7 @@
               <a:rPr lang="en-US" smtClean="0"/>
               <a:t>‹#›</a:t>
             </a:fld>
-            <a:endParaRPr lang="en-US"/>
+            <a:endParaRPr lang="en-US" dirty="0"/>
           </a:p>
         </p:txBody>
       </p:sp>
@@ -351,7 +355,7 @@
             </a:lvl1pPr>
           </a:lstStyle>
           <a:p>
-            <a:endParaRPr lang="en-US"/>
+            <a:endParaRPr lang="en-US" dirty="0"/>
           </a:p>
         </p:txBody>
       </p:sp>
@@ -384,9 +388,9 @@
           <a:p>
             <a:fld id="{FD3EFF1E-85A1-6640-AFB9-C38833E80A84}" type="datetimeFigureOut">
               <a:rPr lang="en-US" smtClean="0"/>
-              <a:t>7/26/16</a:t>
+              <a:t>9/5/2017</a:t>
             </a:fld>
-            <a:endParaRPr lang="en-US"/>
+            <a:endParaRPr lang="en-US" dirty="0"/>
           </a:p>
         </p:txBody>
       </p:sp>
@@ -419,7 +423,7 @@
           <a:bodyPr vert="horz" lIns="91440" tIns="45720" rIns="91440" bIns="45720" rtlCol="0" anchor="ctr"/>
           <a:lstStyle/>
           <a:p>
-            <a:endParaRPr lang="en-US"/>
+            <a:endParaRPr lang="en-US" dirty="0"/>
           </a:p>
         </p:txBody>
       </p:sp>
@@ -448,38 +452,37 @@
           <a:p>
             <a:pPr lvl="0"/>
             <a:r>
-              <a:rPr lang="en-US" smtClean="0"/>
+              <a:rPr lang="en-US"/>
               <a:t>Click to edit Master text styles</a:t>
             </a:r>
           </a:p>
           <a:p>
             <a:pPr lvl="1"/>
             <a:r>
-              <a:rPr lang="en-US" smtClean="0"/>
+              <a:rPr lang="en-US"/>
               <a:t>Second level</a:t>
             </a:r>
           </a:p>
           <a:p>
             <a:pPr lvl="2"/>
             <a:r>
-              <a:rPr lang="en-US" smtClean="0"/>
+              <a:rPr lang="en-US"/>
               <a:t>Third level</a:t>
             </a:r>
           </a:p>
           <a:p>
             <a:pPr lvl="3"/>
             <a:r>
-              <a:rPr lang="en-US" smtClean="0"/>
+              <a:rPr lang="en-US"/>
               <a:t>Fourth level</a:t>
             </a:r>
           </a:p>
           <a:p>
             <a:pPr lvl="4"/>
             <a:r>
-              <a:rPr lang="en-US" smtClean="0"/>
+              <a:rPr lang="en-US"/>
               <a:t>Fifth level</a:t>
             </a:r>
-            <a:endParaRPr lang="en-US"/>
           </a:p>
         </p:txBody>
       </p:sp>
@@ -510,7 +513,7 @@
             </a:lvl1pPr>
           </a:lstStyle>
           <a:p>
-            <a:endParaRPr lang="en-US"/>
+            <a:endParaRPr lang="en-US" dirty="0"/>
           </a:p>
         </p:txBody>
       </p:sp>
@@ -545,7 +548,7 @@
               <a:rPr lang="en-US" smtClean="0"/>
               <a:t>‹#›</a:t>
             </a:fld>
-            <a:endParaRPr lang="en-US"/>
+            <a:endParaRPr lang="en-US" dirty="0"/>
           </a:p>
         </p:txBody>
       </p:sp>
@@ -697,7 +700,7 @@
           <a:bodyPr/>
           <a:lstStyle/>
           <a:p>
-            <a:endParaRPr lang="en-US"/>
+            <a:endParaRPr lang="en-US" dirty="0"/>
           </a:p>
         </p:txBody>
       </p:sp>
@@ -720,7 +723,7 @@
               <a:rPr lang="en-US" smtClean="0"/>
               <a:t>1</a:t>
             </a:fld>
-            <a:endParaRPr lang="en-US"/>
+            <a:endParaRPr lang="en-US" dirty="0"/>
           </a:p>
         </p:txBody>
       </p:sp>
@@ -781,7 +784,7 @@
           <a:bodyPr/>
           <a:lstStyle/>
           <a:p>
-            <a:endParaRPr lang="en-US"/>
+            <a:endParaRPr lang="en-US" dirty="0"/>
           </a:p>
         </p:txBody>
       </p:sp>
@@ -804,7 +807,7 @@
               <a:rPr lang="en-US" smtClean="0"/>
               <a:t>2</a:t>
             </a:fld>
-            <a:endParaRPr lang="en-US"/>
+            <a:endParaRPr lang="en-US" dirty="0"/>
           </a:p>
         </p:txBody>
       </p:sp>
@@ -812,6 +815,90 @@
     <p:extLst>
       <p:ext uri="{BB962C8B-B14F-4D97-AF65-F5344CB8AC3E}">
         <p14:creationId xmlns:p14="http://schemas.microsoft.com/office/powerpoint/2010/main" val="202319656"/>
+      </p:ext>
+    </p:extLst>
+  </p:cSld>
+  <p:clrMapOvr>
+    <a:masterClrMapping/>
+  </p:clrMapOvr>
+</p:notes>
+</file>
+
+<file path=ppt/notesSlides/notesSlide3.xml><?xml version="1.0" encoding="utf-8"?>
+<p:notes xmlns:a="http://schemas.openxmlformats.org/drawingml/2006/main" xmlns:r="http://schemas.openxmlformats.org/officeDocument/2006/relationships" xmlns:p="http://schemas.openxmlformats.org/presentationml/2006/main">
+  <p:cSld>
+    <p:spTree>
+      <p:nvGrpSpPr>
+        <p:cNvPr id="1" name=""/>
+        <p:cNvGrpSpPr/>
+        <p:nvPr/>
+      </p:nvGrpSpPr>
+      <p:grpSpPr>
+        <a:xfrm>
+          <a:off x="0" y="0"/>
+          <a:ext cx="0" cy="0"/>
+          <a:chOff x="0" y="0"/>
+          <a:chExt cx="0" cy="0"/>
+        </a:xfrm>
+      </p:grpSpPr>
+      <p:sp>
+        <p:nvSpPr>
+          <p:cNvPr id="2" name="Slide Image Placeholder 1"/>
+          <p:cNvSpPr>
+            <a:spLocks noGrp="1" noRot="1" noChangeAspect="1"/>
+          </p:cNvSpPr>
+          <p:nvPr>
+            <p:ph type="sldImg"/>
+          </p:nvPr>
+        </p:nvSpPr>
+        <p:spPr/>
+      </p:sp>
+      <p:sp>
+        <p:nvSpPr>
+          <p:cNvPr id="3" name="Notes Placeholder 2"/>
+          <p:cNvSpPr>
+            <a:spLocks noGrp="1"/>
+          </p:cNvSpPr>
+          <p:nvPr>
+            <p:ph type="body" idx="1"/>
+          </p:nvPr>
+        </p:nvSpPr>
+        <p:spPr/>
+        <p:txBody>
+          <a:bodyPr/>
+          <a:lstStyle/>
+          <a:p>
+            <a:endParaRPr lang="en-US" dirty="0"/>
+          </a:p>
+        </p:txBody>
+      </p:sp>
+      <p:sp>
+        <p:nvSpPr>
+          <p:cNvPr id="4" name="Slide Number Placeholder 3"/>
+          <p:cNvSpPr>
+            <a:spLocks noGrp="1"/>
+          </p:cNvSpPr>
+          <p:nvPr>
+            <p:ph type="sldNum" sz="quarter" idx="10"/>
+          </p:nvPr>
+        </p:nvSpPr>
+        <p:spPr/>
+        <p:txBody>
+          <a:bodyPr/>
+          <a:lstStyle/>
+          <a:p>
+            <a:fld id="{13967457-1E83-1040-AFF7-8D09C473DBD5}" type="slidenum">
+              <a:rPr lang="en-US" smtClean="0"/>
+              <a:t>7</a:t>
+            </a:fld>
+            <a:endParaRPr lang="en-US" dirty="0"/>
+          </a:p>
+        </p:txBody>
+      </p:sp>
+    </p:spTree>
+    <p:extLst>
+      <p:ext uri="{BB962C8B-B14F-4D97-AF65-F5344CB8AC3E}">
+        <p14:creationId xmlns:p14="http://schemas.microsoft.com/office/powerpoint/2010/main" val="1082253336"/>
       </p:ext>
     </p:extLst>
   </p:cSld>
@@ -949,7 +1036,7 @@
           </a:lstStyle>
           <a:p>
             <a:r>
-              <a:rPr lang="en-US" smtClean="0"/>
+              <a:rPr lang="en-US"/>
               <a:t>Click to edit Master subtitle style</a:t>
             </a:r>
             <a:endParaRPr lang="en-US" dirty="0"/>
@@ -973,9 +1060,9 @@
           <a:p>
             <a:fld id="{285EF27D-8752-DA47-8D7E-2F48280CEEBD}" type="datetime1">
               <a:rPr lang="en-US" smtClean="0"/>
-              <a:t>7/26/16</a:t>
+              <a:t>9/5/2017</a:t>
             </a:fld>
-            <a:endParaRPr lang="en-US"/>
+            <a:endParaRPr lang="en-US" dirty="0"/>
           </a:p>
         </p:txBody>
       </p:sp>
@@ -1000,10 +1087,9 @@
           <a:lstStyle/>
           <a:p>
             <a:r>
-              <a:rPr lang="en-US" smtClean="0"/>
+              <a:rPr lang="en-US" dirty="0"/>
               <a:t>© EV3Lessons.com, 2016, (Last edit: 7/26/2016)</a:t>
             </a:r>
-            <a:endParaRPr lang="en-US"/>
           </a:p>
         </p:txBody>
       </p:sp>
@@ -1042,7 +1128,7 @@
               <a:rPr lang="en-US" smtClean="0"/>
               <a:t>‹#›</a:t>
             </a:fld>
-            <a:endParaRPr lang="en-US"/>
+            <a:endParaRPr lang="en-US" dirty="0"/>
           </a:p>
         </p:txBody>
       </p:sp>
@@ -1229,10 +1315,9 @@
           <a:p>
             <a:pPr algn="ctr"/>
             <a:r>
-              <a:rPr lang="en-US" sz="3200" dirty="0" smtClean="0"/>
+              <a:rPr lang="en-US" sz="3200" dirty="0"/>
               <a:t>BEGINNER PROGRAMMING LESSON</a:t>
             </a:r>
-            <a:endParaRPr lang="en-US" sz="3200" dirty="0"/>
           </a:p>
         </p:txBody>
       </p:sp>
@@ -1260,14 +1345,9 @@
           <a:p>
             <a:pPr algn="ctr"/>
             <a:r>
-              <a:rPr lang="en-US" dirty="0" smtClean="0"/>
-              <a:t>By Sanjay and Arvind </a:t>
-            </a:r>
-            <a:r>
-              <a:rPr lang="en-US" dirty="0" err="1" smtClean="0"/>
-              <a:t>Seshan</a:t>
-            </a:r>
-            <a:endParaRPr lang="en-US" dirty="0"/>
+              <a:rPr lang="en-US" dirty="0"/>
+              <a:t>By Sanjay and Arvind Seshan</a:t>
+            </a:r>
           </a:p>
         </p:txBody>
       </p:sp>
@@ -1312,7 +1392,7 @@
           <a:bodyPr/>
           <a:lstStyle/>
           <a:p>
-            <a:endParaRPr lang="en-US"/>
+            <a:endParaRPr lang="en-US" dirty="0"/>
           </a:p>
         </p:txBody>
       </p:sp>
@@ -1357,7 +1437,7 @@
           <a:bodyPr/>
           <a:lstStyle/>
           <a:p>
-            <a:endParaRPr lang="en-US"/>
+            <a:endParaRPr lang="en-US" dirty="0"/>
           </a:p>
         </p:txBody>
       </p:sp>
@@ -1402,7 +1482,7 @@
           <a:bodyPr/>
           <a:lstStyle/>
           <a:p>
-            <a:endParaRPr lang="en-US"/>
+            <a:endParaRPr lang="en-US" dirty="0"/>
           </a:p>
         </p:txBody>
       </p:sp>
@@ -1416,13 +1496,6 @@
   <p:clrMapOvr>
     <a:masterClrMapping/>
   </p:clrMapOvr>
-  <p:timing>
-    <p:tnLst>
-      <p:par>
-        <p:cTn id="1" dur="indefinite" restart="never" nodeType="tmRoot"/>
-      </p:par>
-    </p:tnLst>
-  </p:timing>
 </p:sldLayout>
 </file>
 
@@ -1459,10 +1532,9 @@
           <a:lstStyle/>
           <a:p>
             <a:r>
-              <a:rPr lang="en-US" smtClean="0"/>
+              <a:rPr lang="en-US"/>
               <a:t>Click to edit Master title style</a:t>
             </a:r>
-            <a:endParaRPr lang="en-US"/>
           </a:p>
         </p:txBody>
       </p:sp>
@@ -1483,38 +1555,37 @@
           <a:p>
             <a:pPr lvl="0"/>
             <a:r>
-              <a:rPr lang="en-US" smtClean="0"/>
+              <a:rPr lang="en-US"/>
               <a:t>Click to edit Master text styles</a:t>
             </a:r>
           </a:p>
           <a:p>
             <a:pPr lvl="1"/>
             <a:r>
-              <a:rPr lang="en-US" smtClean="0"/>
+              <a:rPr lang="en-US"/>
               <a:t>Second level</a:t>
             </a:r>
           </a:p>
           <a:p>
             <a:pPr lvl="2"/>
             <a:r>
-              <a:rPr lang="en-US" smtClean="0"/>
+              <a:rPr lang="en-US"/>
               <a:t>Third level</a:t>
             </a:r>
           </a:p>
           <a:p>
             <a:pPr lvl="3"/>
             <a:r>
-              <a:rPr lang="en-US" smtClean="0"/>
+              <a:rPr lang="en-US"/>
               <a:t>Fourth level</a:t>
             </a:r>
           </a:p>
           <a:p>
             <a:pPr lvl="4"/>
             <a:r>
-              <a:rPr lang="en-US" smtClean="0"/>
+              <a:rPr lang="en-US"/>
               <a:t>Fifth level</a:t>
             </a:r>
-            <a:endParaRPr lang="en-US"/>
           </a:p>
         </p:txBody>
       </p:sp>
@@ -1535,9 +1606,9 @@
           <a:p>
             <a:fld id="{B60890B9-E024-BA42-9704-A64AD3034426}" type="datetime1">
               <a:rPr lang="en-US" smtClean="0"/>
-              <a:t>7/26/16</a:t>
+              <a:t>9/5/2017</a:t>
             </a:fld>
-            <a:endParaRPr lang="en-US"/>
+            <a:endParaRPr lang="en-US" dirty="0"/>
           </a:p>
         </p:txBody>
       </p:sp>
@@ -1557,10 +1628,9 @@
           <a:lstStyle/>
           <a:p>
             <a:r>
-              <a:rPr lang="en-US" smtClean="0"/>
+              <a:rPr lang="en-US" dirty="0"/>
               <a:t>© EV3Lessons.com, 2016, (Last edit: 7/26/2016)</a:t>
             </a:r>
-            <a:endParaRPr lang="en-US"/>
           </a:p>
         </p:txBody>
       </p:sp>
@@ -1591,7 +1661,7 @@
               <a:rPr lang="en-US" smtClean="0"/>
               <a:t>‹#›</a:t>
             </a:fld>
-            <a:endParaRPr lang="en-US"/>
+            <a:endParaRPr lang="en-US" dirty="0"/>
           </a:p>
         </p:txBody>
       </p:sp>
@@ -1646,10 +1716,9 @@
           <a:lstStyle/>
           <a:p>
             <a:r>
-              <a:rPr lang="en-US" smtClean="0"/>
+              <a:rPr lang="en-US"/>
               <a:t>Click to edit Master title style</a:t>
             </a:r>
-            <a:endParaRPr lang="en-US"/>
           </a:p>
         </p:txBody>
       </p:sp>
@@ -1675,38 +1744,37 @@
           <a:p>
             <a:pPr lvl="0"/>
             <a:r>
-              <a:rPr lang="en-US" smtClean="0"/>
+              <a:rPr lang="en-US"/>
               <a:t>Click to edit Master text styles</a:t>
             </a:r>
           </a:p>
           <a:p>
             <a:pPr lvl="1"/>
             <a:r>
-              <a:rPr lang="en-US" smtClean="0"/>
+              <a:rPr lang="en-US"/>
               <a:t>Second level</a:t>
             </a:r>
           </a:p>
           <a:p>
             <a:pPr lvl="2"/>
             <a:r>
-              <a:rPr lang="en-US" smtClean="0"/>
+              <a:rPr lang="en-US"/>
               <a:t>Third level</a:t>
             </a:r>
           </a:p>
           <a:p>
             <a:pPr lvl="3"/>
             <a:r>
-              <a:rPr lang="en-US" smtClean="0"/>
+              <a:rPr lang="en-US"/>
               <a:t>Fourth level</a:t>
             </a:r>
           </a:p>
           <a:p>
             <a:pPr lvl="4"/>
             <a:r>
-              <a:rPr lang="en-US" smtClean="0"/>
+              <a:rPr lang="en-US"/>
               <a:t>Fifth level</a:t>
             </a:r>
-            <a:endParaRPr lang="en-US"/>
           </a:p>
         </p:txBody>
       </p:sp>
@@ -1727,9 +1795,9 @@
           <a:p>
             <a:fld id="{22A91C9D-C322-9642-A879-CBC9D9628B53}" type="datetime1">
               <a:rPr lang="en-US" smtClean="0"/>
-              <a:t>7/26/16</a:t>
+              <a:t>9/5/2017</a:t>
             </a:fld>
-            <a:endParaRPr lang="en-US"/>
+            <a:endParaRPr lang="en-US" dirty="0"/>
           </a:p>
         </p:txBody>
       </p:sp>
@@ -1749,10 +1817,9 @@
           <a:lstStyle/>
           <a:p>
             <a:r>
-              <a:rPr lang="en-US" smtClean="0"/>
+              <a:rPr lang="en-US" dirty="0"/>
               <a:t>© EV3Lessons.com, 2016, (Last edit: 7/26/2016)</a:t>
             </a:r>
-            <a:endParaRPr lang="en-US"/>
           </a:p>
         </p:txBody>
       </p:sp>
@@ -1783,7 +1850,7 @@
               <a:rPr lang="en-US" smtClean="0"/>
               <a:t>‹#›</a:t>
             </a:fld>
-            <a:endParaRPr lang="en-US"/>
+            <a:endParaRPr lang="en-US" dirty="0"/>
           </a:p>
         </p:txBody>
       </p:sp>
@@ -1842,10 +1909,9 @@
           </a:lstStyle>
           <a:p>
             <a:r>
-              <a:rPr lang="en-US" smtClean="0"/>
+              <a:rPr lang="en-US"/>
               <a:t>Click to edit Master title style</a:t>
             </a:r>
-            <a:endParaRPr lang="en-US"/>
           </a:p>
         </p:txBody>
       </p:sp>
@@ -1907,10 +1973,9 @@
           </a:lstStyle>
           <a:p>
             <a:r>
-              <a:rPr lang="en-US" smtClean="0"/>
+              <a:rPr lang="en-US"/>
               <a:t>Click to edit Master subtitle style</a:t>
             </a:r>
-            <a:endParaRPr lang="en-US"/>
           </a:p>
         </p:txBody>
       </p:sp>
@@ -1931,9 +1996,9 @@
           <a:p>
             <a:fld id="{30FD59F4-988B-4F4A-8FAA-FF739FF4538A}" type="datetime1">
               <a:rPr lang="en-US" smtClean="0"/>
-              <a:t>7/26/16</a:t>
+              <a:t>9/5/2017</a:t>
             </a:fld>
-            <a:endParaRPr lang="en-US"/>
+            <a:endParaRPr lang="en-US" dirty="0"/>
           </a:p>
         </p:txBody>
       </p:sp>
@@ -1953,10 +2018,9 @@
           <a:lstStyle/>
           <a:p>
             <a:r>
-              <a:rPr lang="en-US" smtClean="0"/>
+              <a:rPr lang="en-US" dirty="0"/>
               <a:t>© EV3Lessons.com, 2016, (Last edit: 7/26/2016)</a:t>
             </a:r>
-            <a:endParaRPr lang="en-US"/>
           </a:p>
         </p:txBody>
       </p:sp>
@@ -1979,7 +2043,7 @@
               <a:rPr lang="en-US" smtClean="0"/>
               <a:t>‹#›</a:t>
             </a:fld>
-            <a:endParaRPr lang="en-US"/>
+            <a:endParaRPr lang="en-US" dirty="0"/>
           </a:p>
         </p:txBody>
       </p:sp>
@@ -2029,10 +2093,9 @@
           <a:lstStyle/>
           <a:p>
             <a:r>
-              <a:rPr lang="en-US" smtClean="0"/>
+              <a:rPr lang="en-US"/>
               <a:t>Click to edit Master title style</a:t>
             </a:r>
-            <a:endParaRPr lang="en-US"/>
           </a:p>
         </p:txBody>
       </p:sp>
@@ -2053,38 +2116,37 @@
           <a:p>
             <a:pPr lvl="0"/>
             <a:r>
-              <a:rPr lang="en-US" smtClean="0"/>
+              <a:rPr lang="en-US"/>
               <a:t>Click to edit Master text styles</a:t>
             </a:r>
           </a:p>
           <a:p>
             <a:pPr lvl="1"/>
             <a:r>
-              <a:rPr lang="en-US" smtClean="0"/>
+              <a:rPr lang="en-US"/>
               <a:t>Second level</a:t>
             </a:r>
           </a:p>
           <a:p>
             <a:pPr lvl="2"/>
             <a:r>
-              <a:rPr lang="en-US" smtClean="0"/>
+              <a:rPr lang="en-US"/>
               <a:t>Third level</a:t>
             </a:r>
           </a:p>
           <a:p>
             <a:pPr lvl="3"/>
             <a:r>
-              <a:rPr lang="en-US" smtClean="0"/>
+              <a:rPr lang="en-US"/>
               <a:t>Fourth level</a:t>
             </a:r>
           </a:p>
           <a:p>
             <a:pPr lvl="4"/>
             <a:r>
-              <a:rPr lang="en-US" smtClean="0"/>
+              <a:rPr lang="en-US"/>
               <a:t>Fifth level</a:t>
             </a:r>
-            <a:endParaRPr lang="en-US"/>
           </a:p>
         </p:txBody>
       </p:sp>
@@ -2105,9 +2167,9 @@
           <a:p>
             <a:fld id="{4AA47985-A0DF-324F-8187-D0D4AD0F6BF2}" type="datetime1">
               <a:rPr lang="en-US" smtClean="0"/>
-              <a:t>7/26/16</a:t>
+              <a:t>9/5/2017</a:t>
             </a:fld>
-            <a:endParaRPr lang="en-US"/>
+            <a:endParaRPr lang="en-US" dirty="0"/>
           </a:p>
         </p:txBody>
       </p:sp>
@@ -2127,10 +2189,9 @@
           <a:lstStyle/>
           <a:p>
             <a:r>
-              <a:rPr lang="en-US" smtClean="0"/>
+              <a:rPr lang="en-US" dirty="0"/>
               <a:t>© EV3Lessons.com, 2016, (Last edit: 7/26/2016)</a:t>
             </a:r>
-            <a:endParaRPr lang="en-US"/>
           </a:p>
         </p:txBody>
       </p:sp>
@@ -2153,7 +2214,7 @@
               <a:rPr lang="en-US" smtClean="0"/>
               <a:t>‹#›</a:t>
             </a:fld>
-            <a:endParaRPr lang="en-US"/>
+            <a:endParaRPr lang="en-US" dirty="0"/>
           </a:p>
         </p:txBody>
       </p:sp>
@@ -2212,10 +2273,9 @@
           </a:lstStyle>
           <a:p>
             <a:r>
-              <a:rPr lang="en-US" smtClean="0"/>
+              <a:rPr lang="en-US"/>
               <a:t>Click to edit Master title style</a:t>
             </a:r>
-            <a:endParaRPr lang="en-US"/>
           </a:p>
         </p:txBody>
       </p:sp>
@@ -2332,7 +2392,7 @@
           <a:p>
             <a:pPr lvl="0"/>
             <a:r>
-              <a:rPr lang="en-US" smtClean="0"/>
+              <a:rPr lang="en-US"/>
               <a:t>Click to edit Master text styles</a:t>
             </a:r>
           </a:p>
@@ -2355,9 +2415,9 @@
           <a:p>
             <a:fld id="{035346D9-F88E-FF42-812F-74AA2C7E9C0D}" type="datetime1">
               <a:rPr lang="en-US" smtClean="0"/>
-              <a:t>7/26/16</a:t>
+              <a:t>9/5/2017</a:t>
             </a:fld>
-            <a:endParaRPr lang="en-US"/>
+            <a:endParaRPr lang="en-US" dirty="0"/>
           </a:p>
         </p:txBody>
       </p:sp>
@@ -2377,10 +2437,9 @@
           <a:lstStyle/>
           <a:p>
             <a:r>
-              <a:rPr lang="en-US" smtClean="0"/>
+              <a:rPr lang="en-US" dirty="0"/>
               <a:t>© EV3Lessons.com, 2016, (Last edit: 7/26/2016)</a:t>
             </a:r>
-            <a:endParaRPr lang="en-US"/>
           </a:p>
         </p:txBody>
       </p:sp>
@@ -2403,7 +2462,7 @@
               <a:rPr lang="en-US" smtClean="0"/>
               <a:t>‹#›</a:t>
             </a:fld>
-            <a:endParaRPr lang="en-US"/>
+            <a:endParaRPr lang="en-US" dirty="0"/>
           </a:p>
         </p:txBody>
       </p:sp>
@@ -2453,10 +2512,9 @@
           <a:lstStyle/>
           <a:p>
             <a:r>
-              <a:rPr lang="en-US" smtClean="0"/>
+              <a:rPr lang="en-US"/>
               <a:t>Click to edit Master title style</a:t>
             </a:r>
-            <a:endParaRPr lang="en-US"/>
           </a:p>
         </p:txBody>
       </p:sp>
@@ -2482,38 +2540,37 @@
           <a:p>
             <a:pPr lvl="0"/>
             <a:r>
-              <a:rPr lang="en-US" smtClean="0"/>
+              <a:rPr lang="en-US"/>
               <a:t>Click to edit Master text styles</a:t>
             </a:r>
           </a:p>
           <a:p>
             <a:pPr lvl="1"/>
             <a:r>
-              <a:rPr lang="en-US" smtClean="0"/>
+              <a:rPr lang="en-US"/>
               <a:t>Second level</a:t>
             </a:r>
           </a:p>
           <a:p>
             <a:pPr lvl="2"/>
             <a:r>
-              <a:rPr lang="en-US" smtClean="0"/>
+              <a:rPr lang="en-US"/>
               <a:t>Third level</a:t>
             </a:r>
           </a:p>
           <a:p>
             <a:pPr lvl="3"/>
             <a:r>
-              <a:rPr lang="en-US" smtClean="0"/>
+              <a:rPr lang="en-US"/>
               <a:t>Fourth level</a:t>
             </a:r>
           </a:p>
           <a:p>
             <a:pPr lvl="4"/>
             <a:r>
-              <a:rPr lang="en-US" smtClean="0"/>
+              <a:rPr lang="en-US"/>
               <a:t>Fifth level</a:t>
             </a:r>
-            <a:endParaRPr lang="en-US"/>
           </a:p>
         </p:txBody>
       </p:sp>
@@ -2539,38 +2596,37 @@
           <a:p>
             <a:pPr lvl="0"/>
             <a:r>
-              <a:rPr lang="en-US" smtClean="0"/>
+              <a:rPr lang="en-US"/>
               <a:t>Click to edit Master text styles</a:t>
             </a:r>
           </a:p>
           <a:p>
             <a:pPr lvl="1"/>
             <a:r>
-              <a:rPr lang="en-US" smtClean="0"/>
+              <a:rPr lang="en-US"/>
               <a:t>Second level</a:t>
             </a:r>
           </a:p>
           <a:p>
             <a:pPr lvl="2"/>
             <a:r>
-              <a:rPr lang="en-US" smtClean="0"/>
+              <a:rPr lang="en-US"/>
               <a:t>Third level</a:t>
             </a:r>
           </a:p>
           <a:p>
             <a:pPr lvl="3"/>
             <a:r>
-              <a:rPr lang="en-US" smtClean="0"/>
+              <a:rPr lang="en-US"/>
               <a:t>Fourth level</a:t>
             </a:r>
           </a:p>
           <a:p>
             <a:pPr lvl="4"/>
             <a:r>
-              <a:rPr lang="en-US" smtClean="0"/>
+              <a:rPr lang="en-US"/>
               <a:t>Fifth level</a:t>
             </a:r>
-            <a:endParaRPr lang="en-US"/>
           </a:p>
         </p:txBody>
       </p:sp>
@@ -2591,9 +2647,9 @@
           <a:p>
             <a:fld id="{94FF9039-61CF-4745-B2F8-D868E6208AB2}" type="datetime1">
               <a:rPr lang="en-US" smtClean="0"/>
-              <a:t>7/26/16</a:t>
+              <a:t>9/5/2017</a:t>
             </a:fld>
-            <a:endParaRPr lang="en-US"/>
+            <a:endParaRPr lang="en-US" dirty="0"/>
           </a:p>
         </p:txBody>
       </p:sp>
@@ -2613,10 +2669,9 @@
           <a:lstStyle/>
           <a:p>
             <a:r>
-              <a:rPr lang="en-US" smtClean="0"/>
+              <a:rPr lang="en-US" dirty="0"/>
               <a:t>© EV3Lessons.com, 2016, (Last edit: 7/26/2016)</a:t>
             </a:r>
-            <a:endParaRPr lang="en-US"/>
           </a:p>
         </p:txBody>
       </p:sp>
@@ -2639,7 +2694,7 @@
               <a:rPr lang="en-US" smtClean="0"/>
               <a:t>‹#›</a:t>
             </a:fld>
-            <a:endParaRPr lang="en-US"/>
+            <a:endParaRPr lang="en-US" dirty="0"/>
           </a:p>
         </p:txBody>
       </p:sp>
@@ -2694,10 +2749,9 @@
           <a:lstStyle/>
           <a:p>
             <a:r>
-              <a:rPr lang="en-US" smtClean="0"/>
+              <a:rPr lang="en-US"/>
               <a:t>Click to edit Master title style</a:t>
             </a:r>
-            <a:endParaRPr lang="en-US"/>
           </a:p>
         </p:txBody>
       </p:sp>
@@ -2760,7 +2814,7 @@
           <a:p>
             <a:pPr lvl="0"/>
             <a:r>
-              <a:rPr lang="en-US" smtClean="0"/>
+              <a:rPr lang="en-US"/>
               <a:t>Click to edit Master text styles</a:t>
             </a:r>
           </a:p>
@@ -2788,38 +2842,37 @@
           <a:p>
             <a:pPr lvl="0"/>
             <a:r>
-              <a:rPr lang="en-US" smtClean="0"/>
+              <a:rPr lang="en-US"/>
               <a:t>Click to edit Master text styles</a:t>
             </a:r>
           </a:p>
           <a:p>
             <a:pPr lvl="1"/>
             <a:r>
-              <a:rPr lang="en-US" smtClean="0"/>
+              <a:rPr lang="en-US"/>
               <a:t>Second level</a:t>
             </a:r>
           </a:p>
           <a:p>
             <a:pPr lvl="2"/>
             <a:r>
-              <a:rPr lang="en-US" smtClean="0"/>
+              <a:rPr lang="en-US"/>
               <a:t>Third level</a:t>
             </a:r>
           </a:p>
           <a:p>
             <a:pPr lvl="3"/>
             <a:r>
-              <a:rPr lang="en-US" smtClean="0"/>
+              <a:rPr lang="en-US"/>
               <a:t>Fourth level</a:t>
             </a:r>
           </a:p>
           <a:p>
             <a:pPr lvl="4"/>
             <a:r>
-              <a:rPr lang="en-US" smtClean="0"/>
+              <a:rPr lang="en-US"/>
               <a:t>Fifth level</a:t>
             </a:r>
-            <a:endParaRPr lang="en-US"/>
           </a:p>
         </p:txBody>
       </p:sp>
@@ -2882,7 +2935,7 @@
           <a:p>
             <a:pPr lvl="0"/>
             <a:r>
-              <a:rPr lang="en-US" smtClean="0"/>
+              <a:rPr lang="en-US"/>
               <a:t>Click to edit Master text styles</a:t>
             </a:r>
           </a:p>
@@ -2910,38 +2963,37 @@
           <a:p>
             <a:pPr lvl="0"/>
             <a:r>
-              <a:rPr lang="en-US" smtClean="0"/>
+              <a:rPr lang="en-US"/>
               <a:t>Click to edit Master text styles</a:t>
             </a:r>
           </a:p>
           <a:p>
             <a:pPr lvl="1"/>
             <a:r>
-              <a:rPr lang="en-US" smtClean="0"/>
+              <a:rPr lang="en-US"/>
               <a:t>Second level</a:t>
             </a:r>
           </a:p>
           <a:p>
             <a:pPr lvl="2"/>
             <a:r>
-              <a:rPr lang="en-US" smtClean="0"/>
+              <a:rPr lang="en-US"/>
               <a:t>Third level</a:t>
             </a:r>
           </a:p>
           <a:p>
             <a:pPr lvl="3"/>
             <a:r>
-              <a:rPr lang="en-US" smtClean="0"/>
+              <a:rPr lang="en-US"/>
               <a:t>Fourth level</a:t>
             </a:r>
           </a:p>
           <a:p>
             <a:pPr lvl="4"/>
             <a:r>
-              <a:rPr lang="en-US" smtClean="0"/>
+              <a:rPr lang="en-US"/>
               <a:t>Fifth level</a:t>
             </a:r>
-            <a:endParaRPr lang="en-US"/>
           </a:p>
         </p:txBody>
       </p:sp>
@@ -2962,9 +3014,9 @@
           <a:p>
             <a:fld id="{A401E130-BE25-AB42-9612-80B178AA6DD9}" type="datetime1">
               <a:rPr lang="en-US" smtClean="0"/>
-              <a:t>7/26/16</a:t>
+              <a:t>9/5/2017</a:t>
             </a:fld>
-            <a:endParaRPr lang="en-US"/>
+            <a:endParaRPr lang="en-US" dirty="0"/>
           </a:p>
         </p:txBody>
       </p:sp>
@@ -2984,10 +3036,9 @@
           <a:lstStyle/>
           <a:p>
             <a:r>
-              <a:rPr lang="en-US" smtClean="0"/>
+              <a:rPr lang="en-US" dirty="0"/>
               <a:t>© EV3Lessons.com, 2016, (Last edit: 7/26/2016)</a:t>
             </a:r>
-            <a:endParaRPr lang="en-US"/>
           </a:p>
         </p:txBody>
       </p:sp>
@@ -3010,7 +3061,7 @@
               <a:rPr lang="en-US" smtClean="0"/>
               <a:t>‹#›</a:t>
             </a:fld>
-            <a:endParaRPr lang="en-US"/>
+            <a:endParaRPr lang="en-US" dirty="0"/>
           </a:p>
         </p:txBody>
       </p:sp>
@@ -3060,10 +3111,9 @@
           <a:lstStyle/>
           <a:p>
             <a:r>
-              <a:rPr lang="en-US" smtClean="0"/>
+              <a:rPr lang="en-US"/>
               <a:t>Click to edit Master title style</a:t>
             </a:r>
-            <a:endParaRPr lang="en-US"/>
           </a:p>
         </p:txBody>
       </p:sp>
@@ -3084,9 +3134,9 @@
           <a:p>
             <a:fld id="{CD051783-2236-BE42-9499-8A2A1CC8E02A}" type="datetime1">
               <a:rPr lang="en-US" smtClean="0"/>
-              <a:t>7/26/16</a:t>
+              <a:t>9/5/2017</a:t>
             </a:fld>
-            <a:endParaRPr lang="en-US"/>
+            <a:endParaRPr lang="en-US" dirty="0"/>
           </a:p>
         </p:txBody>
       </p:sp>
@@ -3106,10 +3156,9 @@
           <a:lstStyle/>
           <a:p>
             <a:r>
-              <a:rPr lang="en-US" smtClean="0"/>
+              <a:rPr lang="en-US" dirty="0"/>
               <a:t>© EV3Lessons.com, 2016, (Last edit: 7/26/2016)</a:t>
             </a:r>
-            <a:endParaRPr lang="en-US"/>
           </a:p>
         </p:txBody>
       </p:sp>
@@ -3132,7 +3181,7 @@
               <a:rPr lang="en-US" smtClean="0"/>
               <a:t>‹#›</a:t>
             </a:fld>
-            <a:endParaRPr lang="en-US"/>
+            <a:endParaRPr lang="en-US" dirty="0"/>
           </a:p>
         </p:txBody>
       </p:sp>
@@ -3183,9 +3232,9 @@
           <a:p>
             <a:fld id="{ECC260FD-C0F5-6B4C-8DF5-6BFA3F60F43A}" type="datetime1">
               <a:rPr lang="en-US" smtClean="0"/>
-              <a:t>7/26/16</a:t>
+              <a:t>9/5/2017</a:t>
             </a:fld>
-            <a:endParaRPr lang="en-US"/>
+            <a:endParaRPr lang="en-US" dirty="0"/>
           </a:p>
         </p:txBody>
       </p:sp>
@@ -3205,10 +3254,9 @@
           <a:lstStyle/>
           <a:p>
             <a:r>
-              <a:rPr lang="en-US" smtClean="0"/>
+              <a:rPr lang="en-US" dirty="0"/>
               <a:t>© EV3Lessons.com, 2016, (Last edit: 7/26/2016)</a:t>
             </a:r>
-            <a:endParaRPr lang="en-US"/>
           </a:p>
         </p:txBody>
       </p:sp>
@@ -3231,7 +3279,7 @@
               <a:rPr lang="en-US" smtClean="0"/>
               <a:t>‹#›</a:t>
             </a:fld>
-            <a:endParaRPr lang="en-US"/>
+            <a:endParaRPr lang="en-US" dirty="0"/>
           </a:p>
         </p:txBody>
       </p:sp>
@@ -3290,10 +3338,9 @@
           </a:lstStyle>
           <a:p>
             <a:r>
-              <a:rPr lang="en-US" smtClean="0"/>
+              <a:rPr lang="en-US"/>
               <a:t>Click to edit Master title style</a:t>
             </a:r>
-            <a:endParaRPr lang="en-US"/>
           </a:p>
         </p:txBody>
       </p:sp>
@@ -3347,38 +3394,37 @@
           <a:p>
             <a:pPr lvl="0"/>
             <a:r>
-              <a:rPr lang="en-US" smtClean="0"/>
+              <a:rPr lang="en-US"/>
               <a:t>Click to edit Master text styles</a:t>
             </a:r>
           </a:p>
           <a:p>
             <a:pPr lvl="1"/>
             <a:r>
-              <a:rPr lang="en-US" smtClean="0"/>
+              <a:rPr lang="en-US"/>
               <a:t>Second level</a:t>
             </a:r>
           </a:p>
           <a:p>
             <a:pPr lvl="2"/>
             <a:r>
-              <a:rPr lang="en-US" smtClean="0"/>
+              <a:rPr lang="en-US"/>
               <a:t>Third level</a:t>
             </a:r>
           </a:p>
           <a:p>
             <a:pPr lvl="3"/>
             <a:r>
-              <a:rPr lang="en-US" smtClean="0"/>
+              <a:rPr lang="en-US"/>
               <a:t>Fourth level</a:t>
             </a:r>
           </a:p>
           <a:p>
             <a:pPr lvl="4"/>
             <a:r>
-              <a:rPr lang="en-US" smtClean="0"/>
+              <a:rPr lang="en-US"/>
               <a:t>Fifth level</a:t>
             </a:r>
-            <a:endParaRPr lang="en-US"/>
           </a:p>
         </p:txBody>
       </p:sp>
@@ -3441,7 +3487,7 @@
           <a:p>
             <a:pPr lvl="0"/>
             <a:r>
-              <a:rPr lang="en-US" smtClean="0"/>
+              <a:rPr lang="en-US"/>
               <a:t>Click to edit Master text styles</a:t>
             </a:r>
           </a:p>
@@ -3464,9 +3510,9 @@
           <a:p>
             <a:fld id="{365B0ECF-EC10-7446-87A9-63B618D8242A}" type="datetime1">
               <a:rPr lang="en-US" smtClean="0"/>
-              <a:t>7/26/16</a:t>
+              <a:t>9/5/2017</a:t>
             </a:fld>
-            <a:endParaRPr lang="en-US"/>
+            <a:endParaRPr lang="en-US" dirty="0"/>
           </a:p>
         </p:txBody>
       </p:sp>
@@ -3486,10 +3532,9 @@
           <a:lstStyle/>
           <a:p>
             <a:r>
-              <a:rPr lang="en-US" smtClean="0"/>
+              <a:rPr lang="en-US" dirty="0"/>
               <a:t>© EV3Lessons.com, 2016, (Last edit: 7/26/2016)</a:t>
             </a:r>
-            <a:endParaRPr lang="en-US"/>
           </a:p>
         </p:txBody>
       </p:sp>
@@ -3512,7 +3557,7 @@
               <a:rPr lang="en-US" smtClean="0"/>
               <a:t>‹#›</a:t>
             </a:fld>
-            <a:endParaRPr lang="en-US"/>
+            <a:endParaRPr lang="en-US" dirty="0"/>
           </a:p>
         </p:txBody>
       </p:sp>
@@ -3567,10 +3612,9 @@
           <a:lstStyle/>
           <a:p>
             <a:r>
-              <a:rPr lang="en-US" smtClean="0"/>
+              <a:rPr lang="en-US"/>
               <a:t>Click to edit Master title style</a:t>
             </a:r>
-            <a:endParaRPr lang="en-US"/>
           </a:p>
         </p:txBody>
       </p:sp>
@@ -3596,35 +3640,35 @@
           <a:p>
             <a:pPr lvl="0"/>
             <a:r>
-              <a:rPr lang="en-US" smtClean="0"/>
+              <a:rPr lang="en-US"/>
               <a:t>Click to edit Master text styles</a:t>
             </a:r>
           </a:p>
           <a:p>
             <a:pPr lvl="1"/>
             <a:r>
-              <a:rPr lang="en-US" smtClean="0"/>
+              <a:rPr lang="en-US"/>
               <a:t>Second level</a:t>
             </a:r>
           </a:p>
           <a:p>
             <a:pPr lvl="2"/>
             <a:r>
-              <a:rPr lang="en-US" smtClean="0"/>
+              <a:rPr lang="en-US"/>
               <a:t>Third level</a:t>
             </a:r>
           </a:p>
           <a:p>
             <a:pPr lvl="3"/>
             <a:r>
-              <a:rPr lang="en-US" smtClean="0"/>
+              <a:rPr lang="en-US"/>
               <a:t>Fourth level</a:t>
             </a:r>
           </a:p>
           <a:p>
             <a:pPr lvl="4"/>
             <a:r>
-              <a:rPr lang="en-US" smtClean="0"/>
+              <a:rPr lang="en-US"/>
               <a:t>Fifth level</a:t>
             </a:r>
             <a:endParaRPr lang="en-US" dirty="0"/>
@@ -3648,9 +3692,9 @@
           <a:p>
             <a:fld id="{2F164C2F-CF2F-8D49-9730-279D575D6EF4}" type="datetime1">
               <a:rPr lang="en-US" smtClean="0"/>
-              <a:t>7/26/16</a:t>
+              <a:t>9/5/2017</a:t>
             </a:fld>
-            <a:endParaRPr lang="en-US"/>
+            <a:endParaRPr lang="en-US" dirty="0"/>
           </a:p>
         </p:txBody>
       </p:sp>
@@ -3670,10 +3714,9 @@
           <a:lstStyle/>
           <a:p>
             <a:r>
-              <a:rPr lang="en-US" smtClean="0"/>
+              <a:rPr lang="en-US" dirty="0"/>
               <a:t>© EV3Lessons.com, 2016, (Last edit: 7/26/2016)</a:t>
             </a:r>
-            <a:endParaRPr lang="en-US"/>
           </a:p>
         </p:txBody>
       </p:sp>
@@ -3718,13 +3761,6 @@
   <p:clrMapOvr>
     <a:masterClrMapping/>
   </p:clrMapOvr>
-  <p:timing>
-    <p:tnLst>
-      <p:par>
-        <p:cTn id="1" dur="indefinite" restart="never" nodeType="tmRoot"/>
-      </p:par>
-    </p:tnLst>
-  </p:timing>
 </p:sldLayout>
 </file>
 
@@ -3770,10 +3806,9 @@
           </a:lstStyle>
           <a:p>
             <a:r>
-              <a:rPr lang="en-US" smtClean="0"/>
+              <a:rPr lang="en-US"/>
               <a:t>Click to edit Master title style</a:t>
             </a:r>
-            <a:endParaRPr lang="en-US"/>
           </a:p>
         </p:txBody>
       </p:sp>
@@ -3835,10 +3870,9 @@
           </a:lstStyle>
           <a:p>
             <a:r>
-              <a:rPr lang="en-US" smtClean="0"/>
+              <a:rPr lang="en-US" dirty="0"/>
               <a:t>Drag picture to placeholder or click icon to add</a:t>
             </a:r>
-            <a:endParaRPr lang="en-US"/>
           </a:p>
         </p:txBody>
       </p:sp>
@@ -3901,7 +3935,7 @@
           <a:p>
             <a:pPr lvl="0"/>
             <a:r>
-              <a:rPr lang="en-US" smtClean="0"/>
+              <a:rPr lang="en-US"/>
               <a:t>Click to edit Master text styles</a:t>
             </a:r>
           </a:p>
@@ -3924,9 +3958,9 @@
           <a:p>
             <a:fld id="{F6BEDEB7-093F-3145-914C-BFCD1032C9B5}" type="datetime1">
               <a:rPr lang="en-US" smtClean="0"/>
-              <a:t>7/26/16</a:t>
+              <a:t>9/5/2017</a:t>
             </a:fld>
-            <a:endParaRPr lang="en-US"/>
+            <a:endParaRPr lang="en-US" dirty="0"/>
           </a:p>
         </p:txBody>
       </p:sp>
@@ -3946,10 +3980,9 @@
           <a:lstStyle/>
           <a:p>
             <a:r>
-              <a:rPr lang="en-US" smtClean="0"/>
+              <a:rPr lang="en-US" dirty="0"/>
               <a:t>© EV3Lessons.com, 2016, (Last edit: 7/26/2016)</a:t>
             </a:r>
-            <a:endParaRPr lang="en-US"/>
           </a:p>
         </p:txBody>
       </p:sp>
@@ -3972,7 +4005,7 @@
               <a:rPr lang="en-US" smtClean="0"/>
               <a:t>‹#›</a:t>
             </a:fld>
-            <a:endParaRPr lang="en-US"/>
+            <a:endParaRPr lang="en-US" dirty="0"/>
           </a:p>
         </p:txBody>
       </p:sp>
@@ -4022,10 +4055,9 @@
           <a:lstStyle/>
           <a:p>
             <a:r>
-              <a:rPr lang="en-US" smtClean="0"/>
+              <a:rPr lang="en-US"/>
               <a:t>Click to edit Master title style</a:t>
             </a:r>
-            <a:endParaRPr lang="en-US"/>
           </a:p>
         </p:txBody>
       </p:sp>
@@ -4046,38 +4078,37 @@
           <a:p>
             <a:pPr lvl="0"/>
             <a:r>
-              <a:rPr lang="en-US" smtClean="0"/>
+              <a:rPr lang="en-US"/>
               <a:t>Click to edit Master text styles</a:t>
             </a:r>
           </a:p>
           <a:p>
             <a:pPr lvl="1"/>
             <a:r>
-              <a:rPr lang="en-US" smtClean="0"/>
+              <a:rPr lang="en-US"/>
               <a:t>Second level</a:t>
             </a:r>
           </a:p>
           <a:p>
             <a:pPr lvl="2"/>
             <a:r>
-              <a:rPr lang="en-US" smtClean="0"/>
+              <a:rPr lang="en-US"/>
               <a:t>Third level</a:t>
             </a:r>
           </a:p>
           <a:p>
             <a:pPr lvl="3"/>
             <a:r>
-              <a:rPr lang="en-US" smtClean="0"/>
+              <a:rPr lang="en-US"/>
               <a:t>Fourth level</a:t>
             </a:r>
           </a:p>
           <a:p>
             <a:pPr lvl="4"/>
             <a:r>
-              <a:rPr lang="en-US" smtClean="0"/>
+              <a:rPr lang="en-US"/>
               <a:t>Fifth level</a:t>
             </a:r>
-            <a:endParaRPr lang="en-US"/>
           </a:p>
         </p:txBody>
       </p:sp>
@@ -4098,9 +4129,9 @@
           <a:p>
             <a:fld id="{7024651B-78BF-264C-99D5-7D13BA71184C}" type="datetime1">
               <a:rPr lang="en-US" smtClean="0"/>
-              <a:t>7/26/16</a:t>
+              <a:t>9/5/2017</a:t>
             </a:fld>
-            <a:endParaRPr lang="en-US"/>
+            <a:endParaRPr lang="en-US" dirty="0"/>
           </a:p>
         </p:txBody>
       </p:sp>
@@ -4120,10 +4151,9 @@
           <a:lstStyle/>
           <a:p>
             <a:r>
-              <a:rPr lang="en-US" smtClean="0"/>
+              <a:rPr lang="en-US" dirty="0"/>
               <a:t>© EV3Lessons.com, 2016, (Last edit: 7/26/2016)</a:t>
             </a:r>
-            <a:endParaRPr lang="en-US"/>
           </a:p>
         </p:txBody>
       </p:sp>
@@ -4146,7 +4176,7 @@
               <a:rPr lang="en-US" smtClean="0"/>
               <a:t>‹#›</a:t>
             </a:fld>
-            <a:endParaRPr lang="en-US"/>
+            <a:endParaRPr lang="en-US" dirty="0"/>
           </a:p>
         </p:txBody>
       </p:sp>
@@ -4201,10 +4231,9 @@
           <a:lstStyle/>
           <a:p>
             <a:r>
-              <a:rPr lang="en-US" smtClean="0"/>
+              <a:rPr lang="en-US"/>
               <a:t>Click to edit Master title style</a:t>
             </a:r>
-            <a:endParaRPr lang="en-US"/>
           </a:p>
         </p:txBody>
       </p:sp>
@@ -4230,38 +4259,37 @@
           <a:p>
             <a:pPr lvl="0"/>
             <a:r>
-              <a:rPr lang="en-US" smtClean="0"/>
+              <a:rPr lang="en-US"/>
               <a:t>Click to edit Master text styles</a:t>
             </a:r>
           </a:p>
           <a:p>
             <a:pPr lvl="1"/>
             <a:r>
-              <a:rPr lang="en-US" smtClean="0"/>
+              <a:rPr lang="en-US"/>
               <a:t>Second level</a:t>
             </a:r>
           </a:p>
           <a:p>
             <a:pPr lvl="2"/>
             <a:r>
-              <a:rPr lang="en-US" smtClean="0"/>
+              <a:rPr lang="en-US"/>
               <a:t>Third level</a:t>
             </a:r>
           </a:p>
           <a:p>
             <a:pPr lvl="3"/>
             <a:r>
-              <a:rPr lang="en-US" smtClean="0"/>
+              <a:rPr lang="en-US"/>
               <a:t>Fourth level</a:t>
             </a:r>
           </a:p>
           <a:p>
             <a:pPr lvl="4"/>
             <a:r>
-              <a:rPr lang="en-US" smtClean="0"/>
+              <a:rPr lang="en-US"/>
               <a:t>Fifth level</a:t>
             </a:r>
-            <a:endParaRPr lang="en-US"/>
           </a:p>
         </p:txBody>
       </p:sp>
@@ -4282,9 +4310,9 @@
           <a:p>
             <a:fld id="{6C840F25-7E4A-9547-A239-7D2C39C8BA83}" type="datetime1">
               <a:rPr lang="en-US" smtClean="0"/>
-              <a:t>7/26/16</a:t>
+              <a:t>9/5/2017</a:t>
             </a:fld>
-            <a:endParaRPr lang="en-US"/>
+            <a:endParaRPr lang="en-US" dirty="0"/>
           </a:p>
         </p:txBody>
       </p:sp>
@@ -4304,10 +4332,9 @@
           <a:lstStyle/>
           <a:p>
             <a:r>
-              <a:rPr lang="en-US" smtClean="0"/>
+              <a:rPr lang="en-US" dirty="0"/>
               <a:t>© EV3Lessons.com, 2016, (Last edit: 7/26/2016)</a:t>
             </a:r>
-            <a:endParaRPr lang="en-US"/>
           </a:p>
         </p:txBody>
       </p:sp>
@@ -4330,7 +4357,7 @@
               <a:rPr lang="en-US" smtClean="0"/>
               <a:t>‹#›</a:t>
             </a:fld>
-            <a:endParaRPr lang="en-US"/>
+            <a:endParaRPr lang="en-US" dirty="0"/>
           </a:p>
         </p:txBody>
       </p:sp>
@@ -4398,7 +4425,7 @@
           </a:lstStyle>
           <a:p>
             <a:r>
-              <a:rPr lang="en-US" smtClean="0"/>
+              <a:rPr lang="en-US"/>
               <a:t>Click to edit Master title style</a:t>
             </a:r>
             <a:endParaRPr lang="en-US" dirty="0"/>
@@ -4517,7 +4544,7 @@
           <a:p>
             <a:pPr lvl="0"/>
             <a:r>
-              <a:rPr lang="en-US" smtClean="0"/>
+              <a:rPr lang="en-US"/>
               <a:t>Click to edit Master text styles</a:t>
             </a:r>
           </a:p>
@@ -4540,9 +4567,9 @@
           <a:p>
             <a:fld id="{0C440D35-5944-1242-8AD2-54CB9F88DCD6}" type="datetime1">
               <a:rPr lang="en-US" smtClean="0"/>
-              <a:t>7/26/16</a:t>
+              <a:t>9/5/2017</a:t>
             </a:fld>
-            <a:endParaRPr lang="en-US"/>
+            <a:endParaRPr lang="en-US" dirty="0"/>
           </a:p>
         </p:txBody>
       </p:sp>
@@ -4573,7 +4600,7 @@
               <a:rPr lang="en-US" smtClean="0"/>
               <a:t>‹#›</a:t>
             </a:fld>
-            <a:endParaRPr lang="en-US"/>
+            <a:endParaRPr lang="en-US" dirty="0"/>
           </a:p>
         </p:txBody>
       </p:sp>
@@ -4593,10 +4620,9 @@
           <a:lstStyle/>
           <a:p>
             <a:r>
-              <a:rPr lang="en-US" smtClean="0"/>
+              <a:rPr lang="en-US" dirty="0"/>
               <a:t>© EV3Lessons.com, 2016, (Last edit: 7/26/2016)</a:t>
             </a:r>
-            <a:endParaRPr lang="en-US"/>
           </a:p>
         </p:txBody>
       </p:sp>
@@ -4651,10 +4677,9 @@
           <a:lstStyle/>
           <a:p>
             <a:r>
-              <a:rPr lang="en-US" smtClean="0"/>
+              <a:rPr lang="en-US"/>
               <a:t>Click to edit Master title style</a:t>
             </a:r>
-            <a:endParaRPr lang="en-US"/>
           </a:p>
         </p:txBody>
       </p:sp>
@@ -4708,35 +4733,35 @@
           <a:p>
             <a:pPr lvl="0"/>
             <a:r>
-              <a:rPr lang="en-US" smtClean="0"/>
+              <a:rPr lang="en-US"/>
               <a:t>Click to edit Master text styles</a:t>
             </a:r>
           </a:p>
           <a:p>
             <a:pPr lvl="1"/>
             <a:r>
-              <a:rPr lang="en-US" smtClean="0"/>
+              <a:rPr lang="en-US"/>
               <a:t>Second level</a:t>
             </a:r>
           </a:p>
           <a:p>
             <a:pPr lvl="2"/>
             <a:r>
-              <a:rPr lang="en-US" smtClean="0"/>
+              <a:rPr lang="en-US"/>
               <a:t>Third level</a:t>
             </a:r>
           </a:p>
           <a:p>
             <a:pPr lvl="3"/>
             <a:r>
-              <a:rPr lang="en-US" smtClean="0"/>
+              <a:rPr lang="en-US"/>
               <a:t>Fourth level</a:t>
             </a:r>
           </a:p>
           <a:p>
             <a:pPr lvl="4"/>
             <a:r>
-              <a:rPr lang="en-US" smtClean="0"/>
+              <a:rPr lang="en-US"/>
               <a:t>Fifth level</a:t>
             </a:r>
             <a:endParaRPr lang="en-US" dirty="0"/>
@@ -4793,35 +4818,35 @@
           <a:p>
             <a:pPr lvl="0"/>
             <a:r>
-              <a:rPr lang="en-US" smtClean="0"/>
+              <a:rPr lang="en-US"/>
               <a:t>Click to edit Master text styles</a:t>
             </a:r>
           </a:p>
           <a:p>
             <a:pPr lvl="1"/>
             <a:r>
-              <a:rPr lang="en-US" smtClean="0"/>
+              <a:rPr lang="en-US"/>
               <a:t>Second level</a:t>
             </a:r>
           </a:p>
           <a:p>
             <a:pPr lvl="2"/>
             <a:r>
-              <a:rPr lang="en-US" smtClean="0"/>
+              <a:rPr lang="en-US"/>
               <a:t>Third level</a:t>
             </a:r>
           </a:p>
           <a:p>
             <a:pPr lvl="3"/>
             <a:r>
-              <a:rPr lang="en-US" smtClean="0"/>
+              <a:rPr lang="en-US"/>
               <a:t>Fourth level</a:t>
             </a:r>
           </a:p>
           <a:p>
             <a:pPr lvl="4"/>
             <a:r>
-              <a:rPr lang="en-US" smtClean="0"/>
+              <a:rPr lang="en-US"/>
               <a:t>Fifth level</a:t>
             </a:r>
             <a:endParaRPr lang="en-US" dirty="0"/>
@@ -4845,9 +4870,9 @@
           <a:p>
             <a:fld id="{4ECE6BFD-AD9A-8F49-9177-DBC967179F4C}" type="datetime1">
               <a:rPr lang="en-US" smtClean="0"/>
-              <a:t>7/26/16</a:t>
+              <a:t>9/5/2017</a:t>
             </a:fld>
-            <a:endParaRPr lang="en-US"/>
+            <a:endParaRPr lang="en-US" dirty="0"/>
           </a:p>
         </p:txBody>
       </p:sp>
@@ -4867,10 +4892,9 @@
           <a:lstStyle/>
           <a:p>
             <a:r>
-              <a:rPr lang="en-US" smtClean="0"/>
+              <a:rPr lang="en-US" dirty="0"/>
               <a:t>© EV3Lessons.com, 2016, (Last edit: 7/26/2016)</a:t>
             </a:r>
-            <a:endParaRPr lang="en-US"/>
           </a:p>
         </p:txBody>
       </p:sp>
@@ -4901,7 +4925,7 @@
               <a:rPr lang="en-US" smtClean="0"/>
               <a:t>‹#›</a:t>
             </a:fld>
-            <a:endParaRPr lang="en-US"/>
+            <a:endParaRPr lang="en-US" dirty="0"/>
           </a:p>
         </p:txBody>
       </p:sp>
@@ -4915,13 +4939,6 @@
   <p:clrMapOvr>
     <a:masterClrMapping/>
   </p:clrMapOvr>
-  <p:timing>
-    <p:tnLst>
-      <p:par>
-        <p:cTn id="1" dur="indefinite" restart="never" nodeType="tmRoot"/>
-      </p:par>
-    </p:tnLst>
-  </p:timing>
 </p:sldLayout>
 </file>
 
@@ -4962,10 +4979,9 @@
           </a:lstStyle>
           <a:p>
             <a:r>
-              <a:rPr lang="en-US" smtClean="0"/>
+              <a:rPr lang="en-US"/>
               <a:t>Click to edit Master title style</a:t>
             </a:r>
-            <a:endParaRPr lang="en-US"/>
           </a:p>
         </p:txBody>
       </p:sp>
@@ -5035,7 +5051,7 @@
           <a:p>
             <a:pPr lvl="0"/>
             <a:r>
-              <a:rPr lang="en-US" smtClean="0"/>
+              <a:rPr lang="en-US"/>
               <a:t>Click to edit Master text styles</a:t>
             </a:r>
           </a:p>
@@ -5091,35 +5107,35 @@
           <a:p>
             <a:pPr lvl="0"/>
             <a:r>
-              <a:rPr lang="en-US" smtClean="0"/>
+              <a:rPr lang="en-US"/>
               <a:t>Click to edit Master text styles</a:t>
             </a:r>
           </a:p>
           <a:p>
             <a:pPr lvl="1"/>
             <a:r>
-              <a:rPr lang="en-US" smtClean="0"/>
+              <a:rPr lang="en-US"/>
               <a:t>Second level</a:t>
             </a:r>
           </a:p>
           <a:p>
             <a:pPr lvl="2"/>
             <a:r>
-              <a:rPr lang="en-US" smtClean="0"/>
+              <a:rPr lang="en-US"/>
               <a:t>Third level</a:t>
             </a:r>
           </a:p>
           <a:p>
             <a:pPr lvl="3"/>
             <a:r>
-              <a:rPr lang="en-US" smtClean="0"/>
+              <a:rPr lang="en-US"/>
               <a:t>Fourth level</a:t>
             </a:r>
           </a:p>
           <a:p>
             <a:pPr lvl="4"/>
             <a:r>
-              <a:rPr lang="en-US" smtClean="0"/>
+              <a:rPr lang="en-US"/>
               <a:t>Fifth level</a:t>
             </a:r>
             <a:endParaRPr lang="en-US" dirty="0"/>
@@ -5200,7 +5216,7 @@
               <a:buNone/>
             </a:pPr>
             <a:r>
-              <a:rPr lang="en-US" smtClean="0"/>
+              <a:rPr lang="en-US"/>
               <a:t>Click to edit Master text styles</a:t>
             </a:r>
           </a:p>
@@ -5256,35 +5272,35 @@
           <a:p>
             <a:pPr lvl="0"/>
             <a:r>
-              <a:rPr lang="en-US" smtClean="0"/>
+              <a:rPr lang="en-US"/>
               <a:t>Click to edit Master text styles</a:t>
             </a:r>
           </a:p>
           <a:p>
             <a:pPr lvl="1"/>
             <a:r>
-              <a:rPr lang="en-US" smtClean="0"/>
+              <a:rPr lang="en-US"/>
               <a:t>Second level</a:t>
             </a:r>
           </a:p>
           <a:p>
             <a:pPr lvl="2"/>
             <a:r>
-              <a:rPr lang="en-US" smtClean="0"/>
+              <a:rPr lang="en-US"/>
               <a:t>Third level</a:t>
             </a:r>
           </a:p>
           <a:p>
             <a:pPr lvl="3"/>
             <a:r>
-              <a:rPr lang="en-US" smtClean="0"/>
+              <a:rPr lang="en-US"/>
               <a:t>Fourth level</a:t>
             </a:r>
           </a:p>
           <a:p>
             <a:pPr lvl="4"/>
             <a:r>
-              <a:rPr lang="en-US" smtClean="0"/>
+              <a:rPr lang="en-US"/>
               <a:t>Fifth level</a:t>
             </a:r>
             <a:endParaRPr lang="en-US" dirty="0"/>
@@ -5308,9 +5324,9 @@
           <a:p>
             <a:fld id="{194C1C2A-38E9-D84B-9F49-E9BC372FC647}" type="datetime1">
               <a:rPr lang="en-US" smtClean="0"/>
-              <a:t>7/26/16</a:t>
+              <a:t>9/5/2017</a:t>
             </a:fld>
-            <a:endParaRPr lang="en-US"/>
+            <a:endParaRPr lang="en-US" dirty="0"/>
           </a:p>
         </p:txBody>
       </p:sp>
@@ -5330,10 +5346,9 @@
           <a:lstStyle/>
           <a:p>
             <a:r>
-              <a:rPr lang="en-US" smtClean="0"/>
+              <a:rPr lang="en-US" dirty="0"/>
               <a:t>© EV3Lessons.com, 2016, (Last edit: 7/26/2016)</a:t>
             </a:r>
-            <a:endParaRPr lang="en-US"/>
           </a:p>
         </p:txBody>
       </p:sp>
@@ -5364,7 +5379,7 @@
               <a:rPr lang="en-US" smtClean="0"/>
               <a:t>‹#›</a:t>
             </a:fld>
-            <a:endParaRPr lang="en-US"/>
+            <a:endParaRPr lang="en-US" dirty="0"/>
           </a:p>
         </p:txBody>
       </p:sp>
@@ -5378,13 +5393,6 @@
   <p:clrMapOvr>
     <a:masterClrMapping/>
   </p:clrMapOvr>
-  <p:timing>
-    <p:tnLst>
-      <p:par>
-        <p:cTn id="1" dur="indefinite" restart="never" nodeType="tmRoot"/>
-      </p:par>
-    </p:tnLst>
-  </p:timing>
 </p:sldLayout>
 </file>
 
@@ -5421,10 +5429,9 @@
           <a:lstStyle/>
           <a:p>
             <a:r>
-              <a:rPr lang="en-US" smtClean="0"/>
+              <a:rPr lang="en-US"/>
               <a:t>Click to edit Master title style</a:t>
             </a:r>
-            <a:endParaRPr lang="en-US"/>
           </a:p>
         </p:txBody>
       </p:sp>
@@ -5445,9 +5452,9 @@
           <a:p>
             <a:fld id="{55658CD0-EB20-D248-A310-A97AFCAECA44}" type="datetime1">
               <a:rPr lang="en-US" smtClean="0"/>
-              <a:t>7/26/16</a:t>
+              <a:t>9/5/2017</a:t>
             </a:fld>
-            <a:endParaRPr lang="en-US"/>
+            <a:endParaRPr lang="en-US" dirty="0"/>
           </a:p>
         </p:txBody>
       </p:sp>
@@ -5467,10 +5474,9 @@
           <a:lstStyle/>
           <a:p>
             <a:r>
-              <a:rPr lang="en-US" smtClean="0"/>
+              <a:rPr lang="en-US" dirty="0"/>
               <a:t>© EV3Lessons.com, 2016, (Last edit: 7/26/2016)</a:t>
             </a:r>
-            <a:endParaRPr lang="en-US"/>
           </a:p>
         </p:txBody>
       </p:sp>
@@ -5501,7 +5507,7 @@
               <a:rPr lang="en-US" smtClean="0"/>
               <a:t>‹#›</a:t>
             </a:fld>
-            <a:endParaRPr lang="en-US"/>
+            <a:endParaRPr lang="en-US" dirty="0"/>
           </a:p>
         </p:txBody>
       </p:sp>
@@ -5515,13 +5521,6 @@
   <p:clrMapOvr>
     <a:masterClrMapping/>
   </p:clrMapOvr>
-  <p:timing>
-    <p:tnLst>
-      <p:par>
-        <p:cTn id="1" dur="indefinite" restart="never" nodeType="tmRoot"/>
-      </p:par>
-    </p:tnLst>
-  </p:timing>
 </p:sldLayout>
 </file>
 
@@ -5559,9 +5558,9 @@
           <a:p>
             <a:fld id="{5BD46B12-2296-264F-AA90-88605EA6A220}" type="datetime1">
               <a:rPr lang="en-US" smtClean="0"/>
-              <a:t>7/26/16</a:t>
+              <a:t>9/5/2017</a:t>
             </a:fld>
-            <a:endParaRPr lang="en-US"/>
+            <a:endParaRPr lang="en-US" dirty="0"/>
           </a:p>
         </p:txBody>
       </p:sp>
@@ -5581,10 +5580,9 @@
           <a:lstStyle/>
           <a:p>
             <a:r>
-              <a:rPr lang="en-US" smtClean="0"/>
+              <a:rPr lang="en-US" dirty="0"/>
               <a:t>© EV3Lessons.com, 2016, (Last edit: 7/26/2016)</a:t>
             </a:r>
-            <a:endParaRPr lang="en-US"/>
           </a:p>
         </p:txBody>
       </p:sp>
@@ -5615,7 +5613,7 @@
               <a:rPr lang="en-US" smtClean="0"/>
               <a:t>‹#›</a:t>
             </a:fld>
-            <a:endParaRPr lang="en-US"/>
+            <a:endParaRPr lang="en-US" dirty="0"/>
           </a:p>
         </p:txBody>
       </p:sp>
@@ -5699,35 +5697,35 @@
           <a:p>
             <a:pPr lvl="0"/>
             <a:r>
-              <a:rPr lang="en-US" smtClean="0"/>
+              <a:rPr lang="en-US"/>
               <a:t>Click to edit Master text styles</a:t>
             </a:r>
           </a:p>
           <a:p>
             <a:pPr lvl="1"/>
             <a:r>
-              <a:rPr lang="en-US" smtClean="0"/>
+              <a:rPr lang="en-US"/>
               <a:t>Second level</a:t>
             </a:r>
           </a:p>
           <a:p>
             <a:pPr lvl="2"/>
             <a:r>
-              <a:rPr lang="en-US" smtClean="0"/>
+              <a:rPr lang="en-US"/>
               <a:t>Third level</a:t>
             </a:r>
           </a:p>
           <a:p>
             <a:pPr lvl="3"/>
             <a:r>
-              <a:rPr lang="en-US" smtClean="0"/>
+              <a:rPr lang="en-US"/>
               <a:t>Fourth level</a:t>
             </a:r>
           </a:p>
           <a:p>
             <a:pPr lvl="4"/>
             <a:r>
-              <a:rPr lang="en-US" smtClean="0"/>
+              <a:rPr lang="en-US"/>
               <a:t>Fifth level</a:t>
             </a:r>
             <a:endParaRPr lang="en-US" dirty="0"/>
@@ -5795,7 +5793,7 @@
           <a:p>
             <a:pPr lvl="0"/>
             <a:r>
-              <a:rPr lang="en-US" smtClean="0"/>
+              <a:rPr lang="en-US"/>
               <a:t>Click to edit Master text styles</a:t>
             </a:r>
           </a:p>
@@ -5818,9 +5816,9 @@
           <a:p>
             <a:fld id="{D5C0B56A-5E28-A144-83AC-55A603D0136C}" type="datetime1">
               <a:rPr lang="en-US" smtClean="0"/>
-              <a:t>7/26/16</a:t>
+              <a:t>9/5/2017</a:t>
             </a:fld>
-            <a:endParaRPr lang="en-US"/>
+            <a:endParaRPr lang="en-US" dirty="0"/>
           </a:p>
         </p:txBody>
       </p:sp>
@@ -5840,10 +5838,9 @@
           <a:lstStyle/>
           <a:p>
             <a:r>
-              <a:rPr lang="en-US" smtClean="0"/>
+              <a:rPr lang="en-US" dirty="0"/>
               <a:t>© EV3Lessons.com, 2016, (Last edit: 7/26/2016)</a:t>
             </a:r>
-            <a:endParaRPr lang="en-US"/>
           </a:p>
         </p:txBody>
       </p:sp>
@@ -5874,7 +5871,7 @@
               <a:rPr lang="en-US" smtClean="0"/>
               <a:t>‹#›</a:t>
             </a:fld>
-            <a:endParaRPr lang="en-US"/>
+            <a:endParaRPr lang="en-US" dirty="0"/>
           </a:p>
         </p:txBody>
       </p:sp>
@@ -5894,10 +5891,9 @@
           <a:lstStyle/>
           <a:p>
             <a:r>
-              <a:rPr lang="en-US" smtClean="0"/>
+              <a:rPr lang="en-US"/>
               <a:t>Click to edit Master title style</a:t>
             </a:r>
-            <a:endParaRPr lang="en-US"/>
           </a:p>
         </p:txBody>
       </p:sp>
@@ -5973,7 +5969,7 @@
           <a:lstStyle/>
           <a:p>
             <a:pPr algn="ctr"/>
-            <a:endParaRPr lang="en-US"/>
+            <a:endParaRPr lang="en-US" dirty="0"/>
           </a:p>
         </p:txBody>
       </p:sp>
@@ -6040,10 +6036,9 @@
           </a:lstStyle>
           <a:p>
             <a:r>
-              <a:rPr lang="en-US" smtClean="0"/>
+              <a:rPr lang="en-US" dirty="0"/>
               <a:t>Drag picture to placeholder or click icon to add</a:t>
             </a:r>
-            <a:endParaRPr lang="en-US"/>
           </a:p>
         </p:txBody>
       </p:sp>
@@ -6106,7 +6101,7 @@
           <a:p>
             <a:pPr lvl="0"/>
             <a:r>
-              <a:rPr lang="en-US" smtClean="0"/>
+              <a:rPr lang="en-US"/>
               <a:t>Click to edit Master text styles</a:t>
             </a:r>
           </a:p>
@@ -6129,9 +6124,9 @@
           <a:p>
             <a:fld id="{C38CAB88-2F47-224D-A2B6-8BABE3AD154C}" type="datetime1">
               <a:rPr lang="en-US" smtClean="0"/>
-              <a:t>7/26/16</a:t>
+              <a:t>9/5/2017</a:t>
             </a:fld>
-            <a:endParaRPr lang="en-US"/>
+            <a:endParaRPr lang="en-US" dirty="0"/>
           </a:p>
         </p:txBody>
       </p:sp>
@@ -6151,10 +6146,9 @@
           <a:lstStyle/>
           <a:p>
             <a:r>
-              <a:rPr lang="en-US" smtClean="0"/>
+              <a:rPr lang="en-US" dirty="0"/>
               <a:t>© EV3Lessons.com, 2016, (Last edit: 7/26/2016)</a:t>
             </a:r>
-            <a:endParaRPr lang="en-US"/>
           </a:p>
         </p:txBody>
       </p:sp>
@@ -6193,7 +6187,7 @@
               <a:rPr lang="en-US" smtClean="0"/>
               <a:t>‹#›</a:t>
             </a:fld>
-            <a:endParaRPr lang="en-US"/>
+            <a:endParaRPr lang="en-US" dirty="0"/>
           </a:p>
         </p:txBody>
       </p:sp>
@@ -6224,7 +6218,7 @@
           </a:lstStyle>
           <a:p>
             <a:r>
-              <a:rPr lang="en-US" smtClean="0"/>
+              <a:rPr lang="en-US"/>
               <a:t>Click to edit Master title style</a:t>
             </a:r>
             <a:endParaRPr lang="en-US" dirty="0"/>
@@ -6273,7 +6267,7 @@
           <a:lstStyle/>
           <a:p>
             <a:pPr algn="ctr"/>
-            <a:endParaRPr lang="en-US"/>
+            <a:endParaRPr lang="en-US" dirty="0"/>
           </a:p>
         </p:txBody>
       </p:sp>
@@ -6338,7 +6332,7 @@
           <a:lstStyle/>
           <a:p>
             <a:r>
-              <a:rPr lang="en-US" smtClean="0"/>
+              <a:rPr lang="en-US"/>
               <a:t>Click to edit Master title style</a:t>
             </a:r>
             <a:endParaRPr lang="en-US" dirty="0"/>
@@ -6372,35 +6366,35 @@
           <a:p>
             <a:pPr lvl="0"/>
             <a:r>
-              <a:rPr lang="en-US" smtClean="0"/>
+              <a:rPr lang="en-US"/>
               <a:t>Click to edit Master text styles</a:t>
             </a:r>
           </a:p>
           <a:p>
             <a:pPr lvl="1"/>
             <a:r>
-              <a:rPr lang="en-US" smtClean="0"/>
+              <a:rPr lang="en-US"/>
               <a:t>Second level</a:t>
             </a:r>
           </a:p>
           <a:p>
             <a:pPr lvl="2"/>
             <a:r>
-              <a:rPr lang="en-US" smtClean="0"/>
+              <a:rPr lang="en-US"/>
               <a:t>Third level</a:t>
             </a:r>
           </a:p>
           <a:p>
             <a:pPr lvl="3"/>
             <a:r>
-              <a:rPr lang="en-US" smtClean="0"/>
+              <a:rPr lang="en-US"/>
               <a:t>Fourth level</a:t>
             </a:r>
           </a:p>
           <a:p>
             <a:pPr lvl="4"/>
             <a:r>
-              <a:rPr lang="en-US" smtClean="0"/>
+              <a:rPr lang="en-US"/>
               <a:t>Fifth level</a:t>
             </a:r>
             <a:endParaRPr lang="en-US" dirty="0"/>
@@ -6440,9 +6434,9 @@
           <a:p>
             <a:fld id="{127D35FA-12D4-364A-BDC9-22E311CBD480}" type="datetime1">
               <a:rPr lang="en-US" smtClean="0"/>
-              <a:t>7/26/16</a:t>
+              <a:t>9/5/2017</a:t>
             </a:fld>
-            <a:endParaRPr lang="en-US"/>
+            <a:endParaRPr lang="en-US" dirty="0"/>
           </a:p>
         </p:txBody>
       </p:sp>
@@ -6478,10 +6472,9 @@
           </a:lstStyle>
           <a:p>
             <a:r>
-              <a:rPr lang="en-US" smtClean="0"/>
+              <a:rPr lang="en-US" dirty="0"/>
               <a:t>© EV3Lessons.com, 2016, (Last edit: 7/26/2016)</a:t>
             </a:r>
-            <a:endParaRPr lang="en-US"/>
           </a:p>
         </p:txBody>
       </p:sp>
@@ -6512,7 +6505,7 @@
               <a:rPr lang="en-US" smtClean="0"/>
               <a:t>‹#›</a:t>
             </a:fld>
-            <a:endParaRPr lang="en-US"/>
+            <a:endParaRPr lang="en-US" dirty="0"/>
           </a:p>
         </p:txBody>
       </p:sp>
@@ -6671,7 +6664,7 @@
           <a:bodyPr/>
           <a:lstStyle/>
           <a:p>
-            <a:endParaRPr lang="en-US"/>
+            <a:endParaRPr lang="en-US" dirty="0"/>
           </a:p>
         </p:txBody>
       </p:sp>
@@ -6716,7 +6709,7 @@
           <a:bodyPr/>
           <a:lstStyle/>
           <a:p>
-            <a:endParaRPr lang="en-US"/>
+            <a:endParaRPr lang="en-US" dirty="0"/>
           </a:p>
         </p:txBody>
       </p:sp>
@@ -6761,7 +6754,7 @@
           <a:bodyPr/>
           <a:lstStyle/>
           <a:p>
-            <a:endParaRPr lang="en-US"/>
+            <a:endParaRPr lang="en-US" dirty="0"/>
           </a:p>
         </p:txBody>
       </p:sp>
@@ -6786,13 +6779,6 @@
     <p:sldLayoutId id="2147483736" r:id="rId10"/>
     <p:sldLayoutId id="2147483737" r:id="rId11"/>
   </p:sldLayoutIdLst>
-  <p:timing>
-    <p:tnLst>
-      <p:par>
-        <p:cTn id="1" dur="indefinite" restart="never" nodeType="tmRoot"/>
-      </p:par>
-    </p:tnLst>
-  </p:timing>
   <p:hf hdr="0" dt="0"/>
   <p:txStyles>
     <p:titleStyle>
@@ -7122,10 +7108,9 @@
           <a:lstStyle/>
           <a:p>
             <a:r>
-              <a:rPr lang="en-US" smtClean="0"/>
+              <a:rPr lang="en-US"/>
               <a:t>Click to edit Master title style</a:t>
             </a:r>
-            <a:endParaRPr lang="en-US"/>
           </a:p>
         </p:txBody>
       </p:sp>
@@ -7156,38 +7141,37 @@
           <a:p>
             <a:pPr lvl="0"/>
             <a:r>
-              <a:rPr lang="en-US" smtClean="0"/>
+              <a:rPr lang="en-US"/>
               <a:t>Click to edit Master text styles</a:t>
             </a:r>
           </a:p>
           <a:p>
             <a:pPr lvl="1"/>
             <a:r>
-              <a:rPr lang="en-US" smtClean="0"/>
+              <a:rPr lang="en-US"/>
               <a:t>Second level</a:t>
             </a:r>
           </a:p>
           <a:p>
             <a:pPr lvl="2"/>
             <a:r>
-              <a:rPr lang="en-US" smtClean="0"/>
+              <a:rPr lang="en-US"/>
               <a:t>Third level</a:t>
             </a:r>
           </a:p>
           <a:p>
             <a:pPr lvl="3"/>
             <a:r>
-              <a:rPr lang="en-US" smtClean="0"/>
+              <a:rPr lang="en-US"/>
               <a:t>Fourth level</a:t>
             </a:r>
           </a:p>
           <a:p>
             <a:pPr lvl="4"/>
             <a:r>
-              <a:rPr lang="en-US" smtClean="0"/>
+              <a:rPr lang="en-US"/>
               <a:t>Fifth level</a:t>
             </a:r>
-            <a:endParaRPr lang="en-US"/>
           </a:p>
         </p:txBody>
       </p:sp>
@@ -7226,9 +7210,9 @@
           <a:p>
             <a:fld id="{F7EC531C-CBE1-1F45-BF7C-8B49A3846760}" type="datetime1">
               <a:rPr lang="en-US" smtClean="0"/>
-              <a:t>7/26/16</a:t>
+              <a:t>9/5/2017</a:t>
             </a:fld>
-            <a:endParaRPr lang="en-US"/>
+            <a:endParaRPr lang="en-US" dirty="0"/>
           </a:p>
         </p:txBody>
       </p:sp>
@@ -7266,10 +7250,9 @@
           </a:lstStyle>
           <a:p>
             <a:r>
-              <a:rPr lang="en-US" smtClean="0"/>
+              <a:rPr lang="en-US" dirty="0"/>
               <a:t>© EV3Lessons.com, 2016, (Last edit: 7/26/2016)</a:t>
             </a:r>
-            <a:endParaRPr lang="en-US"/>
           </a:p>
         </p:txBody>
       </p:sp>
@@ -7310,7 +7293,7 @@
               <a:rPr lang="en-US" smtClean="0"/>
               <a:t>‹#›</a:t>
             </a:fld>
-            <a:endParaRPr lang="en-US"/>
+            <a:endParaRPr lang="en-US" dirty="0"/>
           </a:p>
         </p:txBody>
       </p:sp>
@@ -7652,10 +7635,9 @@
           <a:lstStyle/>
           <a:p>
             <a:r>
-              <a:rPr lang="en-US" dirty="0" smtClean="0"/>
-              <a:t>Loops</a:t>
-            </a:r>
-            <a:endParaRPr lang="en-US" dirty="0"/>
+              <a:rPr lang="es-MX" dirty="0"/>
+              <a:t>Bucles</a:t>
+            </a:r>
           </a:p>
         </p:txBody>
       </p:sp>
@@ -7669,15 +7651,40 @@
             <p:ph type="ctrTitle"/>
           </p:nvPr>
         </p:nvSpPr>
-        <p:spPr/>
+        <p:spPr>
+          <a:xfrm>
+            <a:off x="188821" y="5741850"/>
+            <a:ext cx="8745390" cy="602769"/>
+          </a:xfrm>
+        </p:spPr>
         <p:txBody>
           <a:bodyPr/>
           <a:lstStyle/>
           <a:p>
             <a:pPr algn="ctr"/>
             <a:r>
-              <a:rPr lang="en-US" dirty="0" smtClean="0"/>
-              <a:t>BEGINNER PROGRAMMING LESSONS</a:t>
+              <a:rPr lang="es-MX" sz="2400" dirty="0">
+                <a:solidFill>
+                  <a:srgbClr val="D1282E"/>
+                </a:solidFill>
+              </a:rPr>
+              <a:t>Lección</a:t>
+            </a:r>
+            <a:r>
+              <a:rPr lang="en-US" sz="2400" dirty="0">
+                <a:solidFill>
+                  <a:srgbClr val="D1282E"/>
+                </a:solidFill>
+              </a:rPr>
+              <a:t> </a:t>
+            </a:r>
+            <a:r>
+              <a:rPr lang="es-MX" sz="2400" dirty="0">
+                <a:solidFill>
+                  <a:srgbClr val="D1282E"/>
+                </a:solidFill>
+              </a:rPr>
+              <a:t>de Programación PARA Principiantes</a:t>
             </a:r>
             <a:endParaRPr lang="en-US" dirty="0"/>
           </a:p>
@@ -7758,10 +7765,9 @@
           <a:lstStyle/>
           <a:p>
             <a:r>
-              <a:rPr lang="en-US" dirty="0" smtClean="0"/>
-              <a:t>Lesson Objectives</a:t>
-            </a:r>
-            <a:endParaRPr lang="en-US" dirty="0"/>
+              <a:rPr lang="es-MX" dirty="0"/>
+              <a:t>Objetivos de la Lección</a:t>
+            </a:r>
           </a:p>
         </p:txBody>
       </p:sp>
@@ -7785,8 +7791,8 @@
               <a:buAutoNum type="arabicPeriod"/>
             </a:pPr>
             <a:r>
-              <a:rPr lang="en-US" dirty="0" smtClean="0"/>
-              <a:t>Learn how to repeat an action</a:t>
+              <a:rPr lang="es-MX" dirty="0"/>
+              <a:t>Aprende a repetir una acción</a:t>
             </a:r>
           </a:p>
           <a:p>
@@ -7795,8 +7801,8 @@
               <a:buAutoNum type="arabicPeriod"/>
             </a:pPr>
             <a:r>
-              <a:rPr lang="en-US" dirty="0" smtClean="0"/>
-              <a:t>Learn how to use Loop Blocks</a:t>
+              <a:rPr lang="es-MX" dirty="0"/>
+              <a:t>Aprenda a usar el bloque de bucle</a:t>
             </a:r>
             <a:endParaRPr lang="en-US" dirty="0"/>
           </a:p>
@@ -7818,10 +7824,9 @@
           <a:lstStyle/>
           <a:p>
             <a:r>
-              <a:rPr lang="en-US" smtClean="0"/>
+              <a:rPr lang="en-US" dirty="0"/>
               <a:t>© EV3Lessons.com, 2016, (Last edit: 7/26/2016)</a:t>
             </a:r>
-            <a:endParaRPr lang="en-US"/>
           </a:p>
         </p:txBody>
       </p:sp>
@@ -7894,10 +7899,9 @@
           <a:lstStyle/>
           <a:p>
             <a:r>
-              <a:rPr lang="en-US" dirty="0" smtClean="0"/>
-              <a:t>Repeating an Action</a:t>
-            </a:r>
-            <a:endParaRPr lang="en-US" dirty="0"/>
+              <a:rPr lang="es-MX" dirty="0"/>
+              <a:t>Repetición de una acción</a:t>
+            </a:r>
           </a:p>
         </p:txBody>
       </p:sp>
@@ -7924,42 +7928,28 @@
           <a:lstStyle/>
           <a:p>
             <a:r>
-              <a:rPr lang="en-US" sz="2800" dirty="0" smtClean="0"/>
-              <a:t>Let’s say we want the robot to repeat an action over and over again.</a:t>
-            </a:r>
-          </a:p>
-          <a:p>
-            <a:r>
-              <a:rPr lang="en-US" sz="2800" dirty="0" smtClean="0"/>
-              <a:t>Would you just copy the block multiple times?</a:t>
-            </a:r>
-          </a:p>
-          <a:p>
-            <a:r>
-              <a:rPr lang="en-US" sz="2800" dirty="0"/>
-              <a:t>	</a:t>
-            </a:r>
-            <a:r>
-              <a:rPr lang="en-US" sz="2800" dirty="0" smtClean="0"/>
-              <a:t>Sure, that could work!</a:t>
-            </a:r>
-          </a:p>
-          <a:p>
-            <a:r>
-              <a:rPr lang="en-US" sz="2800" dirty="0" smtClean="0"/>
-              <a:t>What if I want to repeat that block forever? </a:t>
-            </a:r>
-          </a:p>
-          <a:p>
-            <a:r>
-              <a:rPr lang="en-US" sz="2800" dirty="0"/>
-              <a:t>	</a:t>
-            </a:r>
-            <a:r>
-              <a:rPr lang="en-US" sz="2800" dirty="0" smtClean="0"/>
-              <a:t>Now what?</a:t>
-            </a:r>
-            <a:endParaRPr lang="en-US" dirty="0"/>
+              <a:rPr lang="es-MX" sz="2800" dirty="0"/>
+              <a:t>Digamos que queremos que el robot repita una acción una y otra vez.</a:t>
+            </a:r>
+          </a:p>
+          <a:p>
+            <a:r>
+              <a:rPr lang="es-MX" sz="2800" dirty="0"/>
+              <a:t>¿Copiarías el bloque varias veces?	¡Claro, eso podría funcionar!</a:t>
+            </a:r>
+          </a:p>
+          <a:p>
+            <a:r>
+              <a:rPr lang="es-MX" sz="2800" dirty="0"/>
+              <a:t>¿Qué pasa si quiero repetir ese bloque para siempre? </a:t>
+            </a:r>
+          </a:p>
+          <a:p>
+            <a:r>
+              <a:rPr lang="es-MX" sz="2800" dirty="0"/>
+              <a:t>	¿Ahora que?</a:t>
+            </a:r>
+            <a:endParaRPr lang="es-MX" dirty="0"/>
           </a:p>
         </p:txBody>
       </p:sp>
@@ -7979,10 +7969,9 @@
           <a:lstStyle/>
           <a:p>
             <a:r>
-              <a:rPr lang="en-US" smtClean="0"/>
+              <a:rPr lang="en-US" dirty="0"/>
               <a:t>© EV3Lessons.com, 2016, (Last edit: 7/26/2016)</a:t>
             </a:r>
-            <a:endParaRPr lang="en-US"/>
           </a:p>
         </p:txBody>
       </p:sp>
@@ -8005,7 +7994,7 @@
               <a:rPr lang="en-US" smtClean="0"/>
               <a:t>3</a:t>
             </a:fld>
-            <a:endParaRPr lang="en-US"/>
+            <a:endParaRPr lang="en-US" dirty="0"/>
           </a:p>
         </p:txBody>
       </p:sp>
@@ -8043,7 +8032,7 @@
           <a:lstStyle/>
           <a:p>
             <a:pPr algn="ctr"/>
-            <a:endParaRPr lang="en-US"/>
+            <a:endParaRPr lang="en-US" dirty="0"/>
           </a:p>
         </p:txBody>
       </p:sp>
@@ -8239,7 +8228,7 @@
             <a:lstStyle/>
             <a:p>
               <a:pPr algn="ctr"/>
-              <a:endParaRPr lang="en-US"/>
+              <a:endParaRPr lang="en-US" dirty="0"/>
             </a:p>
           </p:txBody>
         </p:sp>
@@ -8283,7 +8272,7 @@
             <a:lstStyle/>
             <a:p>
               <a:pPr algn="ctr"/>
-              <a:endParaRPr lang="en-US">
+              <a:endParaRPr lang="en-US" dirty="0">
                 <a:effectLst/>
               </a:endParaRPr>
             </a:p>
@@ -8329,7 +8318,7 @@
             <a:lstStyle/>
             <a:p>
               <a:pPr algn="ctr"/>
-              <a:endParaRPr lang="en-US">
+              <a:endParaRPr lang="en-US" dirty="0">
                 <a:effectLst/>
               </a:endParaRPr>
             </a:p>
@@ -8375,7 +8364,7 @@
             <a:lstStyle/>
             <a:p>
               <a:pPr algn="ctr"/>
-              <a:endParaRPr lang="en-US"/>
+              <a:endParaRPr lang="en-US" dirty="0"/>
             </a:p>
           </p:txBody>
         </p:sp>
@@ -8390,13 +8379,6 @@
   <p:clrMapOvr>
     <a:masterClrMapping/>
   </p:clrMapOvr>
-  <p:timing>
-    <p:tnLst>
-      <p:par>
-        <p:cTn id="1" dur="indefinite" restart="never" nodeType="tmRoot"/>
-      </p:par>
-    </p:tnLst>
-  </p:timing>
 </p:sld>
 </file>
 
@@ -8463,10 +8445,9 @@
           <a:lstStyle/>
           <a:p>
             <a:r>
-              <a:rPr lang="en-US" dirty="0" smtClean="0"/>
-              <a:t>Loops</a:t>
-            </a:r>
-            <a:endParaRPr lang="en-US" dirty="0"/>
+              <a:rPr lang="es-MX" dirty="0"/>
+              <a:t>Bucles o ciclos</a:t>
+            </a:r>
           </a:p>
         </p:txBody>
       </p:sp>
@@ -8493,80 +8474,43 @@
           <a:lstStyle/>
           <a:p>
             <a:r>
-              <a:rPr lang="en-US" dirty="0" smtClean="0"/>
-              <a:t>Loops make repeating a task multiple times </a:t>
-            </a:r>
-            <a:r>
-              <a:rPr lang="en-US" dirty="0" smtClean="0"/>
-              <a:t>easy</a:t>
-            </a:r>
-          </a:p>
-          <a:p>
-            <a:r>
-              <a:rPr lang="en-US" dirty="0" smtClean="0"/>
-              <a:t>The added benefit is that </a:t>
-            </a:r>
-            <a:r>
-              <a:rPr lang="en-US" dirty="0" smtClean="0"/>
-              <a:t>a </a:t>
-            </a:r>
-            <a:r>
-              <a:rPr lang="en-US" dirty="0" smtClean="0"/>
-              <a:t>loop </a:t>
-            </a:r>
-            <a:r>
-              <a:rPr lang="en-US" dirty="0" smtClean="0"/>
-              <a:t>can end </a:t>
-            </a:r>
-            <a:r>
-              <a:rPr lang="en-US" dirty="0" smtClean="0"/>
-              <a:t>whenever you </a:t>
-            </a:r>
-            <a:r>
-              <a:rPr lang="en-US" dirty="0" smtClean="0"/>
-              <a:t>want (a specific number of times, run forever, a specific condition, </a:t>
-            </a:r>
-            <a:r>
-              <a:rPr lang="en-US" dirty="0" err="1" smtClean="0"/>
-              <a:t>etc</a:t>
-            </a:r>
-            <a:r>
-              <a:rPr lang="en-US" dirty="0" smtClean="0"/>
-              <a:t>)</a:t>
-            </a:r>
-            <a:endParaRPr lang="en-US" dirty="0" smtClean="0"/>
+              <a:rPr lang="es-MX" dirty="0"/>
+              <a:t>Los bucles hacen que la repetición de una tarea sea fácil.</a:t>
+            </a:r>
+          </a:p>
+          <a:p>
+            <a:r>
+              <a:rPr lang="es-MX" dirty="0"/>
+              <a:t>El beneficio adicional es que un bucle puede terminar cuando quiera (un número específico de veces, ejecutar para siempre, una condición específica, etc.)</a:t>
+            </a:r>
           </a:p>
           <a:p>
             <a:pPr lvl="1"/>
-            <a:endParaRPr lang="en-US" dirty="0"/>
+            <a:endParaRPr lang="es-MX" dirty="0"/>
           </a:p>
           <a:p>
             <a:pPr lvl="1"/>
-            <a:endParaRPr lang="en-US" dirty="0" smtClean="0"/>
+            <a:endParaRPr lang="es-MX" dirty="0"/>
           </a:p>
           <a:p>
             <a:pPr lvl="1"/>
-            <a:endParaRPr lang="en-US" dirty="0" smtClean="0"/>
+            <a:endParaRPr lang="es-MX" dirty="0"/>
           </a:p>
           <a:p>
             <a:pPr lvl="1"/>
-            <a:endParaRPr lang="en-US" dirty="0" smtClean="0"/>
+            <a:endParaRPr lang="es-MX" dirty="0"/>
           </a:p>
           <a:p>
             <a:pPr lvl="1"/>
-            <a:endParaRPr lang="en-US" dirty="0" smtClean="0"/>
+            <a:endParaRPr lang="es-MX" dirty="0"/>
           </a:p>
           <a:p>
             <a:pPr lvl="1"/>
-            <a:endParaRPr lang="en-US" dirty="0" smtClean="0"/>
+            <a:endParaRPr lang="es-MX" dirty="0"/>
           </a:p>
           <a:p>
             <a:pPr lvl="1"/>
-            <a:endParaRPr lang="en-US" dirty="0" smtClean="0"/>
-          </a:p>
-          <a:p>
-            <a:pPr lvl="1"/>
-            <a:endParaRPr lang="en-US" dirty="0"/>
+            <a:endParaRPr lang="es-MX" dirty="0"/>
           </a:p>
         </p:txBody>
       </p:sp>
@@ -8586,10 +8530,9 @@
           <a:lstStyle/>
           <a:p>
             <a:r>
-              <a:rPr lang="en-US" smtClean="0"/>
+              <a:rPr lang="en-US" dirty="0"/>
               <a:t>© EV3Lessons.com, 2016, (Last edit: 7/26/2016)</a:t>
             </a:r>
-            <a:endParaRPr lang="en-US"/>
           </a:p>
         </p:txBody>
       </p:sp>
@@ -8612,7 +8555,7 @@
               <a:rPr lang="en-US" smtClean="0"/>
               <a:t>4</a:t>
             </a:fld>
-            <a:endParaRPr lang="en-US"/>
+            <a:endParaRPr lang="en-US" dirty="0"/>
           </a:p>
         </p:txBody>
       </p:sp>
@@ -8729,13 +8672,6 @@
   <p:clrMapOvr>
     <a:masterClrMapping/>
   </p:clrMapOvr>
-  <p:timing>
-    <p:tnLst>
-      <p:par>
-        <p:cTn id="1" dur="indefinite" restart="never" nodeType="tmRoot"/>
-      </p:par>
-    </p:tnLst>
-  </p:timing>
 </p:sld>
 </file>
 
@@ -8802,10 +8738,9 @@
           <a:lstStyle/>
           <a:p>
             <a:r>
-              <a:rPr lang="en-US" dirty="0" smtClean="0"/>
-              <a:t>LOOP CHALLENGE</a:t>
-            </a:r>
-            <a:endParaRPr lang="en-US" dirty="0"/>
+              <a:rPr lang="es-MX" dirty="0"/>
+              <a:t>Desafío del bucle</a:t>
+            </a:r>
           </a:p>
         </p:txBody>
       </p:sp>
@@ -8827,44 +8762,18 @@
         </p:spPr>
         <p:txBody>
           <a:bodyPr>
-            <a:normAutofit fontScale="92500" lnSpcReduction="10000"/>
+            <a:normAutofit lnSpcReduction="10000"/>
           </a:bodyPr>
           <a:lstStyle/>
           <a:p>
             <a:r>
-              <a:rPr lang="en-US" dirty="0">
+              <a:rPr lang="es-MX" dirty="0">
                 <a:solidFill>
                   <a:srgbClr val="FF0000"/>
                 </a:solidFill>
               </a:rPr>
-              <a:t>Challenge: </a:t>
-            </a:r>
-            <a:r>
-              <a:rPr lang="en-US" dirty="0" smtClean="0">
-                <a:solidFill>
-                  <a:srgbClr val="FF0000"/>
-                </a:solidFill>
-              </a:rPr>
-              <a:t>Write </a:t>
-            </a:r>
-            <a:r>
-              <a:rPr lang="en-US" dirty="0">
-                <a:solidFill>
-                  <a:srgbClr val="FF0000"/>
-                </a:solidFill>
-              </a:rPr>
-              <a:t>a program to go around a </a:t>
-            </a:r>
-            <a:r>
-              <a:rPr lang="en-US" dirty="0" smtClean="0">
-                <a:solidFill>
-                  <a:srgbClr val="FF0000"/>
-                </a:solidFill>
-              </a:rPr>
-              <a:t>box once.</a:t>
-            </a:r>
-          </a:p>
-          <a:p>
+              <a:t>Desafío: Escribe un programa para ir alrededor de una caja una sola vez.</a:t>
+            </a:r>
             <a:endParaRPr lang="en-US" dirty="0">
               <a:solidFill>
                 <a:srgbClr val="FF0000"/>
@@ -8872,13 +8781,6 @@
             </a:endParaRPr>
           </a:p>
           <a:p>
-            <a:endParaRPr lang="en-US" dirty="0" smtClean="0">
-              <a:solidFill>
-                <a:srgbClr val="FF0000"/>
-              </a:solidFill>
-            </a:endParaRPr>
-          </a:p>
-          <a:p>
             <a:endParaRPr lang="en-US" dirty="0">
               <a:solidFill>
                 <a:srgbClr val="FF0000"/>
@@ -8893,16 +8795,6 @@
             </a:endParaRPr>
           </a:p>
           <a:p>
-            <a:r>
-              <a:rPr lang="en-US" dirty="0" smtClean="0">
-                <a:solidFill>
-                  <a:srgbClr val="FF0000"/>
-                </a:solidFill>
-              </a:rPr>
-              <a:t>The simple way is to code it like this:</a:t>
-            </a:r>
-          </a:p>
-          <a:p>
             <a:endParaRPr lang="en-US" dirty="0">
               <a:solidFill>
                 <a:srgbClr val="FF0000"/>
@@ -8910,40 +8802,52 @@
             </a:endParaRPr>
           </a:p>
           <a:p>
-            <a:endParaRPr lang="en-US" dirty="0" smtClean="0">
+            <a:r>
+              <a:rPr lang="es-MX" dirty="0">
+                <a:solidFill>
+                  <a:srgbClr val="FF0000"/>
+                </a:solidFill>
+              </a:rPr>
+              <a:t>La manera mas simple de programarlo es así:</a:t>
+            </a:r>
+          </a:p>
+          <a:p>
+            <a:endParaRPr lang="es-MX" dirty="0">
               <a:solidFill>
                 <a:srgbClr val="FF0000"/>
               </a:solidFill>
             </a:endParaRPr>
           </a:p>
           <a:p>
-            <a:endParaRPr lang="en-US" dirty="0">
+            <a:endParaRPr lang="es-MX" dirty="0">
               <a:solidFill>
                 <a:srgbClr val="FF0000"/>
               </a:solidFill>
             </a:endParaRPr>
           </a:p>
           <a:p>
-            <a:endParaRPr lang="en-US" dirty="0" smtClean="0">
+            <a:endParaRPr lang="es-MX" dirty="0">
               <a:solidFill>
                 <a:srgbClr val="FF0000"/>
               </a:solidFill>
             </a:endParaRPr>
           </a:p>
           <a:p>
-            <a:r>
-              <a:rPr lang="en-US" dirty="0" smtClean="0">
+            <a:endParaRPr lang="es-MX" dirty="0">
+              <a:solidFill>
+                <a:srgbClr val="FF0000"/>
+              </a:solidFill>
+            </a:endParaRPr>
+          </a:p>
+          <a:p>
+            <a:r>
+              <a:rPr lang="es-MX" dirty="0">
                 <a:solidFill>
                   <a:srgbClr val="FF0000"/>
                 </a:solidFill>
               </a:rPr>
-              <a:t>Use a loop to improve the code</a:t>
-            </a:r>
-            <a:endParaRPr lang="en-US" dirty="0">
-              <a:solidFill>
-                <a:srgbClr val="FF0000"/>
-              </a:solidFill>
-            </a:endParaRPr>
+              <a:t>Usar un bucle para mejorar el código</a:t>
+            </a:r>
           </a:p>
         </p:txBody>
       </p:sp>
@@ -8963,10 +8867,9 @@
           <a:lstStyle/>
           <a:p>
             <a:r>
-              <a:rPr lang="en-US" smtClean="0"/>
+              <a:rPr lang="en-US" dirty="0"/>
               <a:t>© EV3Lessons.com, 2016, (Last edit: 7/26/2016)</a:t>
             </a:r>
-            <a:endParaRPr lang="en-US"/>
           </a:p>
         </p:txBody>
       </p:sp>
@@ -9041,7 +8944,7 @@
             <a:lstStyle/>
             <a:p>
               <a:pPr algn="ctr"/>
-              <a:endParaRPr lang="en-US"/>
+              <a:endParaRPr lang="en-US" dirty="0"/>
             </a:p>
           </p:txBody>
         </p:sp>
@@ -9237,7 +9140,7 @@
               <a:lstStyle/>
               <a:p>
                 <a:pPr algn="ctr"/>
-                <a:endParaRPr lang="en-US"/>
+                <a:endParaRPr lang="en-US" dirty="0"/>
               </a:p>
             </p:txBody>
           </p:sp>
@@ -9281,7 +9184,7 @@
               <a:lstStyle/>
               <a:p>
                 <a:pPr algn="ctr"/>
-                <a:endParaRPr lang="en-US">
+                <a:endParaRPr lang="en-US" dirty="0">
                   <a:effectLst/>
                 </a:endParaRPr>
               </a:p>
@@ -9327,7 +9230,7 @@
               <a:lstStyle/>
               <a:p>
                 <a:pPr algn="ctr"/>
-                <a:endParaRPr lang="en-US">
+                <a:endParaRPr lang="en-US" dirty="0">
                   <a:effectLst/>
                 </a:endParaRPr>
               </a:p>
@@ -9373,7 +9276,7 @@
               <a:lstStyle/>
               <a:p>
                 <a:pPr algn="ctr"/>
-                <a:endParaRPr lang="en-US"/>
+                <a:endParaRPr lang="en-US" dirty="0"/>
               </a:p>
             </p:txBody>
           </p:sp>
@@ -9425,10 +9328,9 @@
           <a:lstStyle/>
           <a:p>
             <a:r>
-              <a:rPr lang="en-US" dirty="0" smtClean="0"/>
+              <a:rPr lang="en-US" dirty="0"/>
               <a:t>Loop CHALLENGE Solution</a:t>
             </a:r>
-            <a:endParaRPr lang="en-US" dirty="0"/>
           </a:p>
         </p:txBody>
       </p:sp>
@@ -9448,10 +9350,9 @@
           <a:lstStyle/>
           <a:p>
             <a:r>
-              <a:rPr lang="en-US" smtClean="0"/>
+              <a:rPr lang="en-US" dirty="0"/>
               <a:t>© EV3Lessons.com, 2016, (Last edit: 7/26/2016)</a:t>
             </a:r>
-            <a:endParaRPr lang="en-US"/>
           </a:p>
         </p:txBody>
       </p:sp>
@@ -9517,7 +9418,7 @@
         <p:spPr>
           <a:xfrm>
             <a:off x="6433457" y="1371600"/>
-            <a:ext cx="1237342" cy="500743"/>
+            <a:ext cx="1237342" cy="607512"/>
           </a:xfrm>
           <a:prstGeom prst="rect">
             <a:avLst/>
@@ -9545,10 +9446,9 @@
           <a:p>
             <a:pPr algn="ctr"/>
             <a:r>
-              <a:rPr lang="en-US" dirty="0" smtClean="0"/>
-              <a:t>Run 4 times</a:t>
-            </a:r>
-            <a:endParaRPr lang="en-US" dirty="0"/>
+              <a:rPr lang="es-MX" dirty="0"/>
+              <a:t>Correr 4 veces</a:t>
+            </a:r>
           </a:p>
         </p:txBody>
       </p:sp>
@@ -9625,6 +9525,87 @@
           </p:spPr>
         </p:pic>
       </p:grpSp>
+      <p:sp>
+        <p:nvSpPr>
+          <p:cNvPr id="3" name="Rectangle 2">
+            <a:extLst>
+              <a:ext uri="{FF2B5EF4-FFF2-40B4-BE49-F238E27FC236}">
+                <a16:creationId xmlns:a16="http://schemas.microsoft.com/office/drawing/2014/main" id="{8CE7F6E4-5412-479C-BBAA-29EBFD4BD93A}"/>
+              </a:ext>
+            </a:extLst>
+          </p:cNvPr>
+          <p:cNvSpPr/>
+          <p:nvPr/>
+        </p:nvSpPr>
+        <p:spPr>
+          <a:xfrm>
+            <a:off x="1578279" y="1524318"/>
+            <a:ext cx="1703540" cy="204274"/>
+          </a:xfrm>
+          <a:prstGeom prst="rect">
+            <a:avLst/>
+          </a:prstGeom>
+          <a:solidFill>
+            <a:srgbClr val="E4E4E4"/>
+          </a:solidFill>
+          <a:ln>
+            <a:solidFill>
+              <a:srgbClr val="E4E4E4"/>
+            </a:solidFill>
+          </a:ln>
+        </p:spPr>
+        <p:style>
+          <a:lnRef idx="2">
+            <a:schemeClr val="accent1">
+              <a:shade val="50000"/>
+            </a:schemeClr>
+          </a:lnRef>
+          <a:fillRef idx="1">
+            <a:schemeClr val="accent1"/>
+          </a:fillRef>
+          <a:effectRef idx="0">
+            <a:schemeClr val="accent1"/>
+          </a:effectRef>
+          <a:fontRef idx="minor">
+            <a:schemeClr val="lt1"/>
+          </a:fontRef>
+        </p:style>
+        <p:txBody>
+          <a:bodyPr rtlCol="0" anchor="ctr"/>
+          <a:lstStyle/>
+          <a:p>
+            <a:pPr algn="ctr"/>
+            <a:r>
+              <a:rPr lang="es-MX" dirty="0">
+                <a:solidFill>
+                  <a:schemeClr val="tx1"/>
+                </a:solidFill>
+                <a:latin typeface="Arial" panose="020B0604020202020204" pitchFamily="34" charset="0"/>
+                <a:cs typeface="Arial" panose="020B0604020202020204" pitchFamily="34" charset="0"/>
+              </a:rPr>
+              <a:t>Mover </a:t>
+            </a:r>
+            <a:r>
+              <a:rPr lang="es-MX" dirty="0">
+                <a:solidFill>
+                  <a:schemeClr val="tx1"/>
+                </a:solidFill>
+                <a:latin typeface="Arial" panose="020B0604020202020204" pitchFamily="34" charset="0"/>
+                <a:cs typeface="Arial" panose="020B0604020202020204" pitchFamily="34" charset="0"/>
+                <a:sym typeface="Wingdings" panose="05000000000000000000" pitchFamily="2" charset="2"/>
+              </a:rPr>
+              <a:t> Girar</a:t>
+            </a:r>
+            <a:endParaRPr lang="es-MX" dirty="0">
+              <a:solidFill>
+                <a:schemeClr val="tx1"/>
+              </a:solidFill>
+              <a:latin typeface="Arial" panose="020B0604020202020204" pitchFamily="34" charset="0"/>
+              <a:cs typeface="Arial" panose="020B0604020202020204" pitchFamily="34" charset="0"/>
+            </a:endParaRPr>
+          </a:p>
+        </p:txBody>
+      </p:sp>
     </p:spTree>
     <p:extLst>
       <p:ext uri="{BB962C8B-B14F-4D97-AF65-F5344CB8AC3E}">
@@ -9676,10 +9657,9 @@
           <a:lstStyle/>
           <a:p>
             <a:r>
-              <a:rPr lang="en-US" dirty="0" smtClean="0"/>
-              <a:t>CREDITS</a:t>
-            </a:r>
-            <a:endParaRPr lang="en-US" dirty="0"/>
+              <a:rPr lang="es-MX" dirty="0"/>
+              <a:t>Créditos</a:t>
+            </a:r>
           </a:p>
         </p:txBody>
       </p:sp>
@@ -9695,8 +9675,8 @@
         </p:nvSpPr>
         <p:spPr>
           <a:xfrm>
-            <a:off x="457200" y="1556657"/>
-            <a:ext cx="8245474" cy="4531232"/>
+            <a:off x="457200" y="1480457"/>
+            <a:ext cx="8245474" cy="4607432"/>
           </a:xfrm>
         </p:spPr>
         <p:txBody>
@@ -9710,14 +9690,9 @@
               <a:buChar char="•"/>
             </a:pPr>
             <a:r>
-              <a:rPr lang="en-US" sz="1800" dirty="0" smtClean="0"/>
-              <a:t>This tutorial was created by Sanjay Seshan and Arvind </a:t>
-            </a:r>
-            <a:r>
-              <a:rPr lang="en-US" sz="1800" dirty="0" err="1" smtClean="0"/>
-              <a:t>Seshan</a:t>
-            </a:r>
-            <a:endParaRPr lang="en-US" sz="1800" dirty="0" smtClean="0"/>
+              <a:rPr lang="es-MX" sz="1800" dirty="0"/>
+              <a:t>Este tutorial fue creado por Sanjay Seshan and Arvind Seshan </a:t>
+            </a:r>
           </a:p>
           <a:p>
             <a:pPr marL="342900" indent="-342900">
@@ -9725,63 +9700,20 @@
               <a:buChar char="•"/>
             </a:pPr>
             <a:r>
-              <a:rPr lang="en-US" sz="1800" dirty="0" smtClean="0"/>
-              <a:t>More lessons are available at www.ev3lessons.com</a:t>
-            </a:r>
-            <a:r>
-              <a:rPr lang="en-US" sz="1800" b="0" dirty="0"/>
-              <a:t/>
-            </a:r>
-            <a:br>
-              <a:rPr lang="en-US" sz="1800" b="0" dirty="0"/>
-            </a:br>
-            <a:endParaRPr lang="en-US" sz="1800" dirty="0" smtClean="0"/>
-          </a:p>
-        </p:txBody>
-      </p:sp>
-      <p:sp>
-        <p:nvSpPr>
-          <p:cNvPr id="4" name="Footer Placeholder 3"/>
-          <p:cNvSpPr>
-            <a:spLocks noGrp="1"/>
-          </p:cNvSpPr>
-          <p:nvPr>
-            <p:ph type="ftr" sz="quarter" idx="11"/>
-          </p:nvPr>
-        </p:nvSpPr>
-        <p:spPr/>
-        <p:txBody>
-          <a:bodyPr/>
-          <a:lstStyle/>
-          <a:p>
-            <a:r>
-              <a:rPr lang="en-US" smtClean="0"/>
-              <a:t>© EV3Lessons.com, 2016, (Last edit: 7/26/2016)</a:t>
-            </a:r>
-            <a:endParaRPr lang="en-US" dirty="0"/>
-          </a:p>
-        </p:txBody>
-      </p:sp>
-      <p:sp>
-        <p:nvSpPr>
-          <p:cNvPr id="9" name="Slide Number Placeholder 8"/>
-          <p:cNvSpPr>
-            <a:spLocks noGrp="1"/>
-          </p:cNvSpPr>
-          <p:nvPr>
-            <p:ph type="sldNum" sz="quarter" idx="12"/>
-          </p:nvPr>
-        </p:nvSpPr>
-        <p:spPr/>
-        <p:txBody>
-          <a:bodyPr/>
-          <a:lstStyle/>
-          <a:p>
-            <a:fld id="{4DBC7FC8-25FB-FC45-8177-2B991DA6778C}" type="slidenum">
-              <a:rPr lang="en-US" smtClean="0"/>
-              <a:t>7</a:t>
-            </a:fld>
-            <a:endParaRPr lang="en-US"/>
+              <a:rPr lang="es-MX" sz="1800" dirty="0"/>
+              <a:t>Traducida por: Ian De La Garza Team: Voltec Robotics 6647</a:t>
+            </a:r>
+          </a:p>
+          <a:p>
+            <a:pPr marL="342900" indent="-342900">
+              <a:buFont typeface="Arial"/>
+              <a:buChar char="•"/>
+            </a:pPr>
+            <a:r>
+              <a:rPr lang="es-MX" sz="1800" dirty="0"/>
+              <a:t>Mas lecciones disponibles en www.ev3lessons.com</a:t>
+            </a:r>
+            <a:endParaRPr lang="en-US" sz="1800" dirty="0"/>
           </a:p>
         </p:txBody>
       </p:sp>
@@ -9966,24 +9898,9 @@
             </a:lvl9pPr>
           </a:lstStyle>
           <a:p>
-            <a:pPr marL="0" marR="0" lvl="0" indent="0" algn="ctr" defTabSz="914400" rtl="0" eaLnBrk="0" fontAlgn="base" latinLnBrk="0" hangingPunct="0">
-              <a:lnSpc>
-                <a:spcPct val="100000"/>
-              </a:lnSpc>
-              <a:spcBef>
-                <a:spcPct val="0"/>
-              </a:spcBef>
-              <a:spcAft>
-                <a:spcPct val="0"/>
-              </a:spcAft>
-              <a:buClrTx/>
-              <a:buSzTx/>
-              <a:buFontTx/>
-              <a:buNone/>
-              <a:tabLst/>
-            </a:pPr>
-            <a:r>
-              <a:rPr kumimoji="0" lang="en-US" altLang="en-US" sz="2000" b="0" i="0" u="none" strike="noStrike" cap="none" normalizeH="0" baseline="0" dirty="0" smtClean="0">
+            <a:pPr lvl="0" algn="ctr" defTabSz="914400"/>
+            <a:r>
+              <a:rPr kumimoji="0" lang="en-US" altLang="en-US" sz="2000" b="0" i="0" u="none" strike="noStrike" cap="none" normalizeH="0" baseline="0" dirty="0">
                 <a:ln>
                   <a:noFill/>
                 </a:ln>
@@ -9995,20 +9912,8 @@
               </a:rPr>
               <a:t>                         </a:t>
             </a:r>
-            <a:r>
-              <a:rPr kumimoji="0" lang="en-US" altLang="en-US" sz="1600" b="0" i="0" u="none" strike="noStrike" cap="none" normalizeH="0" baseline="0" dirty="0" smtClean="0">
-                <a:ln>
-                  <a:noFill/>
-                </a:ln>
-                <a:solidFill>
-                  <a:schemeClr val="tx1"/>
-                </a:solidFill>
-                <a:effectLst/>
-              </a:rPr>
-              <a:t/>
-            </a:r>
             <a:br>
-              <a:rPr kumimoji="0" lang="en-US" altLang="en-US" sz="1600" b="0" i="0" u="none" strike="noStrike" cap="none" normalizeH="0" baseline="0" dirty="0" smtClean="0">
+              <a:rPr kumimoji="0" lang="en-US" altLang="en-US" sz="1600" b="0" i="0" u="none" strike="noStrike" cap="none" normalizeH="0" baseline="0" dirty="0">
                 <a:ln>
                   <a:noFill/>
                 </a:ln>
@@ -10019,7 +9924,16 @@
               </a:rPr>
             </a:br>
             <a:r>
-              <a:rPr kumimoji="0" lang="en-US" altLang="en-US" sz="2000" b="0" i="0" u="none" strike="noStrike" cap="none" normalizeH="0" baseline="0" dirty="0" smtClean="0">
+              <a:rPr lang="es-MX" altLang="en-US" sz="2000" dirty="0">
+                <a:solidFill>
+                  <a:srgbClr val="000000"/>
+                </a:solidFill>
+                <a:latin typeface="Helvetica Neue"/>
+              </a:rPr>
+              <a:t>Esta obra obtiene su licencia bajo </a:t>
+            </a:r>
+            <a:r>
+              <a:rPr kumimoji="0" lang="en-US" altLang="en-US" sz="2000" b="0" i="0" u="none" strike="noStrike" cap="none" normalizeH="0" baseline="0" dirty="0">
                 <a:ln>
                   <a:noFill/>
                 </a:ln>
@@ -10029,10 +9943,10 @@
                 <a:effectLst/>
                 <a:latin typeface="Helvetica Neue"/>
               </a:rPr>
-              <a:t>This work is licensed under a </a:t>
-            </a:r>
-            <a:r>
-              <a:rPr kumimoji="0" lang="en-US" altLang="en-US" sz="2000" b="0" i="0" u="none" strike="noStrike" cap="none" normalizeH="0" baseline="0" dirty="0" smtClean="0">
+              <a:t> </a:t>
+            </a:r>
+            <a:r>
+              <a:rPr kumimoji="0" lang="en-US" altLang="en-US" sz="2000" b="0" i="0" u="none" strike="noStrike" cap="none" normalizeH="0" baseline="0" dirty="0">
                 <a:ln>
                   <a:noFill/>
                 </a:ln>
@@ -10041,68 +9955,12 @@
                 </a:solidFill>
                 <a:effectLst/>
                 <a:latin typeface="Helvetica Neue"/>
-                <a:hlinkClick r:id="rId2"/>
+                <a:hlinkClick r:id="rId3"/>
               </a:rPr>
-              <a:t>Creative Commons Attribution-</a:t>
-            </a:r>
-            <a:r>
-              <a:rPr kumimoji="0" lang="en-US" altLang="en-US" sz="2000" b="0" i="0" u="none" strike="noStrike" cap="none" normalizeH="0" baseline="0" dirty="0" err="1" smtClean="0">
-                <a:ln>
-                  <a:noFill/>
-                </a:ln>
-                <a:solidFill>
-                  <a:srgbClr val="4374B7"/>
-                </a:solidFill>
-                <a:effectLst/>
-                <a:latin typeface="Helvetica Neue"/>
-                <a:hlinkClick r:id="rId2"/>
-              </a:rPr>
-              <a:t>NonCommercial</a:t>
-            </a:r>
-            <a:r>
-              <a:rPr kumimoji="0" lang="en-US" altLang="en-US" sz="2000" b="0" i="0" u="none" strike="noStrike" cap="none" normalizeH="0" baseline="0" dirty="0" smtClean="0">
-                <a:ln>
-                  <a:noFill/>
-                </a:ln>
-                <a:solidFill>
-                  <a:srgbClr val="4374B7"/>
-                </a:solidFill>
-                <a:effectLst/>
-                <a:latin typeface="Helvetica Neue"/>
-                <a:hlinkClick r:id="rId2"/>
-              </a:rPr>
-              <a:t>-</a:t>
-            </a:r>
-            <a:r>
-              <a:rPr kumimoji="0" lang="en-US" altLang="en-US" sz="2000" b="0" i="0" u="none" strike="noStrike" cap="none" normalizeH="0" baseline="0" dirty="0" err="1" smtClean="0">
-                <a:ln>
-                  <a:noFill/>
-                </a:ln>
-                <a:solidFill>
-                  <a:srgbClr val="4374B7"/>
-                </a:solidFill>
-                <a:effectLst/>
-                <a:latin typeface="Helvetica Neue"/>
-                <a:hlinkClick r:id="rId2"/>
-              </a:rPr>
-              <a:t>ShareAlike</a:t>
-            </a:r>
-            <a:r>
-              <a:rPr kumimoji="0" lang="en-US" altLang="en-US" sz="2000" b="0" i="0" u="none" strike="noStrike" cap="none" normalizeH="0" baseline="0" dirty="0" smtClean="0">
-                <a:ln>
-                  <a:noFill/>
-                </a:ln>
-                <a:solidFill>
-                  <a:srgbClr val="4374B7"/>
-                </a:solidFill>
-                <a:effectLst/>
-                <a:latin typeface="Helvetica Neue"/>
-                <a:hlinkClick r:id="rId2"/>
-              </a:rPr>
-              <a:t> 4.0 International License</a:t>
-            </a:r>
-            <a:r>
-              <a:rPr kumimoji="0" lang="en-US" altLang="en-US" sz="2000" b="0" i="0" u="none" strike="noStrike" cap="none" normalizeH="0" baseline="0" dirty="0" smtClean="0">
+              <a:t>Creative Commons Attribution-NonCommercial-ShareAlike 4.0 International License</a:t>
+            </a:r>
+            <a:r>
+              <a:rPr kumimoji="0" lang="en-US" altLang="en-US" sz="2000" b="0" i="0" u="none" strike="noStrike" cap="none" normalizeH="0" baseline="0" dirty="0">
                 <a:ln>
                   <a:noFill/>
                 </a:ln>
@@ -10115,7 +9973,7 @@
               <a:t>.</a:t>
             </a:r>
             <a:r>
-              <a:rPr kumimoji="0" lang="en-US" altLang="en-US" sz="1600" b="0" i="0" u="none" strike="noStrike" cap="none" normalizeH="0" baseline="0" dirty="0" smtClean="0">
+              <a:rPr kumimoji="0" lang="en-US" altLang="en-US" sz="1600" b="0" i="0" u="none" strike="noStrike" cap="none" normalizeH="0" baseline="0" dirty="0">
                 <a:ln>
                   <a:noFill/>
                 </a:ln>
@@ -10126,7 +9984,7 @@
               </a:rPr>
               <a:t> </a:t>
             </a:r>
-            <a:endParaRPr kumimoji="0" lang="en-US" altLang="en-US" sz="2000" b="0" i="0" u="none" strike="noStrike" cap="none" normalizeH="0" baseline="0" dirty="0" smtClean="0">
+            <a:endParaRPr kumimoji="0" lang="en-US" altLang="en-US" sz="2000" b="0" i="0" u="none" strike="noStrike" cap="none" normalizeH="0" baseline="0" dirty="0">
               <a:ln>
                 <a:noFill/>
               </a:ln>
@@ -10142,7 +10000,7 @@
       <p:pic>
         <p:nvPicPr>
           <p:cNvPr id="2050" name="Picture 2" descr="Creative Commons License">
-            <a:hlinkClick r:id="rId2"/>
+            <a:hlinkClick r:id="rId3"/>
           </p:cNvPr>
           <p:cNvPicPr>
             <a:picLocks noChangeAspect="1" noChangeArrowheads="1"/>
@@ -10150,10 +10008,10 @@
           <p:nvPr/>
         </p:nvPicPr>
         <p:blipFill>
-          <a:blip r:embed="rId3">
+          <a:blip r:embed="rId4">
             <a:extLst>
               <a:ext uri="{28A0092B-C50C-407E-A947-70E740481C1C}">
-                <a14:useLocalDpi xmlns:a14="http://schemas.microsoft.com/office/drawing/2010/main" val="0"/>
+                <a14:useLocalDpi xmlns:a14="http://schemas.microsoft.com/office/drawing/2010/main"/>
               </a:ext>
             </a:extLst>
           </a:blip>
@@ -10182,23 +10040,39 @@
           </a:extLst>
         </p:spPr>
       </p:pic>
+      <p:sp>
+        <p:nvSpPr>
+          <p:cNvPr id="5" name="Slide Number Placeholder 4"/>
+          <p:cNvSpPr>
+            <a:spLocks noGrp="1"/>
+          </p:cNvSpPr>
+          <p:nvPr>
+            <p:ph type="sldNum" sz="quarter" idx="12"/>
+          </p:nvPr>
+        </p:nvSpPr>
+        <p:spPr/>
+        <p:txBody>
+          <a:bodyPr/>
+          <a:lstStyle/>
+          <a:p>
+            <a:fld id="{4DBC7FC8-25FB-FC45-8177-2B991DA6778C}" type="slidenum">
+              <a:rPr lang="en-US" smtClean="0"/>
+              <a:t>7</a:t>
+            </a:fld>
+            <a:endParaRPr lang="en-US" dirty="0"/>
+          </a:p>
+        </p:txBody>
+      </p:sp>
     </p:spTree>
     <p:extLst>
       <p:ext uri="{BB962C8B-B14F-4D97-AF65-F5344CB8AC3E}">
-        <p14:creationId xmlns:p14="http://schemas.microsoft.com/office/powerpoint/2010/main" val="2351472469"/>
+        <p14:creationId xmlns:p14="http://schemas.microsoft.com/office/powerpoint/2010/main" val="3927622676"/>
       </p:ext>
     </p:extLst>
   </p:cSld>
   <p:clrMapOvr>
     <a:masterClrMapping/>
   </p:clrMapOvr>
-  <p:timing>
-    <p:tnLst>
-      <p:par>
-        <p:cTn id="1" dur="indefinite" restart="never" nodeType="tmRoot"/>
-      </p:par>
-    </p:tnLst>
-  </p:timing>
 </p:sld>
 </file>
 

</xml_diff>